<commit_message>
Disciplina CLP MODBUS - 24Abr2025
</commit_message>
<xml_diff>
--- a/01 Classes/Aula6 - CLP - Redes Industriais MODBUS.pptx
+++ b/01 Classes/Aula6 - CLP - Redes Industriais MODBUS.pptx
@@ -5,7 +5,7 @@
     <p:sldMasterId id="2147483648" r:id="rId1"/>
   </p:sldMasterIdLst>
   <p:notesMasterIdLst>
-    <p:notesMasterId r:id="rId34"/>
+    <p:notesMasterId r:id="rId36"/>
   </p:notesMasterIdLst>
   <p:sldIdLst>
     <p:sldId id="256" r:id="rId2"/>
@@ -38,8 +38,10 @@
     <p:sldId id="333" r:id="rId29"/>
     <p:sldId id="323" r:id="rId30"/>
     <p:sldId id="360" r:id="rId31"/>
-    <p:sldId id="337" r:id="rId32"/>
-    <p:sldId id="309" r:id="rId33"/>
+    <p:sldId id="385" r:id="rId32"/>
+    <p:sldId id="386" r:id="rId33"/>
+    <p:sldId id="337" r:id="rId34"/>
+    <p:sldId id="309" r:id="rId35"/>
   </p:sldIdLst>
   <p:sldSz cx="9144000" cy="5143500" type="screen16x9"/>
   <p:notesSz cx="6858000" cy="9144000"/>
@@ -2399,6 +2401,174 @@
 </file>
 
 <file path=ppt/notesSlides/notesSlide30.xml><?xml version="1.0" encoding="utf-8"?>
+<p:notes xmlns:a="http://schemas.openxmlformats.org/drawingml/2006/main" xmlns:r="http://schemas.openxmlformats.org/officeDocument/2006/relationships" xmlns:p="http://schemas.openxmlformats.org/presentationml/2006/main">
+  <p:cSld>
+    <p:spTree>
+      <p:nvGrpSpPr>
+        <p:cNvPr id="1" name="">
+          <a:extLst>
+            <a:ext uri="{FF2B5EF4-FFF2-40B4-BE49-F238E27FC236}">
+              <a16:creationId xmlns:a16="http://schemas.microsoft.com/office/drawing/2014/main" id="{F1B6C004-D400-9AA7-4DA3-CE2576E7CC03}"/>
+            </a:ext>
+          </a:extLst>
+        </p:cNvPr>
+        <p:cNvGrpSpPr/>
+        <p:nvPr/>
+      </p:nvGrpSpPr>
+      <p:grpSpPr>
+        <a:xfrm>
+          <a:off x="0" y="0"/>
+          <a:ext cx="0" cy="0"/>
+          <a:chOff x="0" y="0"/>
+          <a:chExt cx="0" cy="0"/>
+        </a:xfrm>
+      </p:grpSpPr>
+      <p:sp>
+        <p:nvSpPr>
+          <p:cNvPr id="2" name="Espaço Reservado para Imagem de Slide 1">
+            <a:extLst>
+              <a:ext uri="{FF2B5EF4-FFF2-40B4-BE49-F238E27FC236}">
+                <a16:creationId xmlns:a16="http://schemas.microsoft.com/office/drawing/2014/main" id="{357EE9CB-263A-F343-ED4C-70095FA474BE}"/>
+              </a:ext>
+            </a:extLst>
+          </p:cNvPr>
+          <p:cNvSpPr>
+            <a:spLocks noGrp="1" noRot="1" noChangeAspect="1"/>
+          </p:cNvSpPr>
+          <p:nvPr>
+            <p:ph type="sldImg"/>
+          </p:nvPr>
+        </p:nvSpPr>
+        <p:spPr>
+          <a:xfrm>
+            <a:off x="381000" y="685800"/>
+            <a:ext cx="6096000" cy="3429000"/>
+          </a:xfrm>
+        </p:spPr>
+      </p:sp>
+      <p:sp>
+        <p:nvSpPr>
+          <p:cNvPr id="3" name="Espaço Reservado para Anotações 2">
+            <a:extLst>
+              <a:ext uri="{FF2B5EF4-FFF2-40B4-BE49-F238E27FC236}">
+                <a16:creationId xmlns:a16="http://schemas.microsoft.com/office/drawing/2014/main" id="{8662846D-9B86-5C29-87C1-0C776120E94A}"/>
+              </a:ext>
+            </a:extLst>
+          </p:cNvPr>
+          <p:cNvSpPr>
+            <a:spLocks noGrp="1"/>
+          </p:cNvSpPr>
+          <p:nvPr>
+            <p:ph type="body" idx="1"/>
+          </p:nvPr>
+        </p:nvSpPr>
+        <p:spPr/>
+        <p:txBody>
+          <a:bodyPr/>
+          <a:lstStyle/>
+          <a:p>
+            <a:endParaRPr lang="pt-BR" dirty="0"/>
+          </a:p>
+        </p:txBody>
+      </p:sp>
+    </p:spTree>
+    <p:extLst>
+      <p:ext uri="{BB962C8B-B14F-4D97-AF65-F5344CB8AC3E}">
+        <p14:creationId xmlns:p14="http://schemas.microsoft.com/office/powerpoint/2010/main" val="200050918"/>
+      </p:ext>
+    </p:extLst>
+  </p:cSld>
+  <p:clrMapOvr>
+    <a:masterClrMapping/>
+  </p:clrMapOvr>
+</p:notes>
+</file>
+
+<file path=ppt/notesSlides/notesSlide31.xml><?xml version="1.0" encoding="utf-8"?>
+<p:notes xmlns:a="http://schemas.openxmlformats.org/drawingml/2006/main" xmlns:r="http://schemas.openxmlformats.org/officeDocument/2006/relationships" xmlns:p="http://schemas.openxmlformats.org/presentationml/2006/main">
+  <p:cSld>
+    <p:spTree>
+      <p:nvGrpSpPr>
+        <p:cNvPr id="1" name="">
+          <a:extLst>
+            <a:ext uri="{FF2B5EF4-FFF2-40B4-BE49-F238E27FC236}">
+              <a16:creationId xmlns:a16="http://schemas.microsoft.com/office/drawing/2014/main" id="{C0303D33-2842-A182-0A6A-E1F4D9CC20E6}"/>
+            </a:ext>
+          </a:extLst>
+        </p:cNvPr>
+        <p:cNvGrpSpPr/>
+        <p:nvPr/>
+      </p:nvGrpSpPr>
+      <p:grpSpPr>
+        <a:xfrm>
+          <a:off x="0" y="0"/>
+          <a:ext cx="0" cy="0"/>
+          <a:chOff x="0" y="0"/>
+          <a:chExt cx="0" cy="0"/>
+        </a:xfrm>
+      </p:grpSpPr>
+      <p:sp>
+        <p:nvSpPr>
+          <p:cNvPr id="2" name="Espaço Reservado para Imagem de Slide 1">
+            <a:extLst>
+              <a:ext uri="{FF2B5EF4-FFF2-40B4-BE49-F238E27FC236}">
+                <a16:creationId xmlns:a16="http://schemas.microsoft.com/office/drawing/2014/main" id="{4AB27425-75A0-C5B7-E954-3C37B185CB11}"/>
+              </a:ext>
+            </a:extLst>
+          </p:cNvPr>
+          <p:cNvSpPr>
+            <a:spLocks noGrp="1" noRot="1" noChangeAspect="1"/>
+          </p:cNvSpPr>
+          <p:nvPr>
+            <p:ph type="sldImg"/>
+          </p:nvPr>
+        </p:nvSpPr>
+        <p:spPr>
+          <a:xfrm>
+            <a:off x="381000" y="685800"/>
+            <a:ext cx="6096000" cy="3429000"/>
+          </a:xfrm>
+        </p:spPr>
+      </p:sp>
+      <p:sp>
+        <p:nvSpPr>
+          <p:cNvPr id="3" name="Espaço Reservado para Anotações 2">
+            <a:extLst>
+              <a:ext uri="{FF2B5EF4-FFF2-40B4-BE49-F238E27FC236}">
+                <a16:creationId xmlns:a16="http://schemas.microsoft.com/office/drawing/2014/main" id="{534E34E2-5E89-5A0B-D3CD-BB87418FE171}"/>
+              </a:ext>
+            </a:extLst>
+          </p:cNvPr>
+          <p:cNvSpPr>
+            <a:spLocks noGrp="1"/>
+          </p:cNvSpPr>
+          <p:nvPr>
+            <p:ph type="body" idx="1"/>
+          </p:nvPr>
+        </p:nvSpPr>
+        <p:spPr/>
+        <p:txBody>
+          <a:bodyPr/>
+          <a:lstStyle/>
+          <a:p>
+            <a:endParaRPr lang="pt-BR" dirty="0"/>
+          </a:p>
+        </p:txBody>
+      </p:sp>
+    </p:spTree>
+    <p:extLst>
+      <p:ext uri="{BB962C8B-B14F-4D97-AF65-F5344CB8AC3E}">
+        <p14:creationId xmlns:p14="http://schemas.microsoft.com/office/powerpoint/2010/main" val="48858685"/>
+      </p:ext>
+    </p:extLst>
+  </p:cSld>
+  <p:clrMapOvr>
+    <a:masterClrMapping/>
+  </p:clrMapOvr>
+</p:notes>
+</file>
+
+<file path=ppt/notesSlides/notesSlide32.xml><?xml version="1.0" encoding="utf-8"?>
 <p:notes xmlns:a="http://schemas.openxmlformats.org/drawingml/2006/main" xmlns:r="http://schemas.openxmlformats.org/officeDocument/2006/relationships" xmlns:p="http://schemas.openxmlformats.org/presentationml/2006/main">
   <p:cSld>
     <p:spTree>
@@ -14720,14 +14890,21 @@
                 <a:latin typeface="Times New Roman" panose="02020603050405020304" pitchFamily="18" charset="0"/>
                 <a:cs typeface="Times New Roman" panose="02020603050405020304" pitchFamily="18" charset="0"/>
               </a:rPr>
-              <a:t>CLP Redes Industriais MODBUS 1</a:t>
-            </a:r>
-            <a:r>
-              <a:rPr lang="pt-BR" sz="2200" dirty="0">
-                <a:latin typeface="Times New Roman" panose="02020603050405020304" pitchFamily="18" charset="0"/>
-                <a:cs typeface="Times New Roman" panose="02020603050405020304" pitchFamily="18" charset="0"/>
-              </a:rPr>
-              <a:t>.</a:t>
+              <a:t>Protocolo </a:t>
+            </a:r>
+            <a:r>
+              <a:rPr lang="pt-BR" sz="2200" b="1" dirty="0" err="1">
+                <a:latin typeface="Times New Roman" panose="02020603050405020304" pitchFamily="18" charset="0"/>
+                <a:cs typeface="Times New Roman" panose="02020603050405020304" pitchFamily="18" charset="0"/>
+              </a:rPr>
+              <a:t>Modbus</a:t>
+            </a:r>
+            <a:r>
+              <a:rPr lang="pt-BR" sz="2200" b="1" dirty="0">
+                <a:latin typeface="Times New Roman" panose="02020603050405020304" pitchFamily="18" charset="0"/>
+                <a:cs typeface="Times New Roman" panose="02020603050405020304" pitchFamily="18" charset="0"/>
+              </a:rPr>
+              <a:t>: Fundamentos e Aplicações.</a:t>
             </a:r>
           </a:p>
           <a:p>
@@ -14753,15 +14930,18 @@
                 <a:cs typeface="Times New Roman" panose="02020603050405020304" pitchFamily="18" charset="0"/>
                 <a:hlinkClick r:id="rId3"/>
               </a:rPr>
-              <a:t>h</a:t>
-            </a:r>
-            <a:endParaRPr lang="pt-BR" sz="2200" dirty="0">
-              <a:solidFill>
-                <a:srgbClr val="FF0000"/>
-              </a:solidFill>
-              <a:latin typeface="Times New Roman" panose="02020603050405020304" pitchFamily="18" charset="0"/>
-              <a:cs typeface="Times New Roman" panose="02020603050405020304" pitchFamily="18" charset="0"/>
-            </a:endParaRPr>
+              <a:t>https://embarcados.com.br/protocolo-modbus/</a:t>
+            </a:r>
+            <a:r>
+              <a:rPr lang="pt-BR" sz="2200" dirty="0">
+                <a:solidFill>
+                  <a:srgbClr val="FF0000"/>
+                </a:solidFill>
+                <a:latin typeface="Times New Roman" panose="02020603050405020304" pitchFamily="18" charset="0"/>
+                <a:cs typeface="Times New Roman" panose="02020603050405020304" pitchFamily="18" charset="0"/>
+              </a:rPr>
+              <a:t> </a:t>
+            </a:r>
           </a:p>
           <a:p>
             <a:pPr marL="0" indent="0" algn="just">
@@ -14796,11 +14976,18 @@
               <a:t>[2] </a:t>
             </a:r>
             <a:r>
+              <a:rPr lang="pt-BR" sz="2200" b="1" dirty="0" err="1">
+                <a:latin typeface="Times New Roman" panose="02020603050405020304" pitchFamily="18" charset="0"/>
+                <a:cs typeface="Times New Roman" panose="02020603050405020304" pitchFamily="18" charset="0"/>
+              </a:rPr>
+              <a:t>Modbus</a:t>
+            </a:r>
+            <a:r>
               <a:rPr lang="pt-BR" sz="2200" b="1" dirty="0">
                 <a:latin typeface="Times New Roman" panose="02020603050405020304" pitchFamily="18" charset="0"/>
                 <a:cs typeface="Times New Roman" panose="02020603050405020304" pitchFamily="18" charset="0"/>
               </a:rPr>
-              <a:t>CLP Redes Industriais MODBUS 2</a:t>
+              <a:t>: como funciona o protocolo, exemplos, fundamentos e mais</a:t>
             </a:r>
             <a:r>
               <a:rPr lang="pt-BR" sz="2200" dirty="0">
@@ -14833,7 +15020,17 @@
                 <a:cs typeface="Times New Roman" panose="02020603050405020304" pitchFamily="18" charset="0"/>
                 <a:hlinkClick r:id="rId4"/>
               </a:rPr>
-              <a:t>h</a:t>
+              <a:t>https://blog.kalatec.com.br/protocolo-modbus/</a:t>
+            </a:r>
+            <a:r>
+              <a:rPr lang="pt-BR" sz="2200" dirty="0">
+                <a:solidFill>
+                  <a:srgbClr val="FF0000"/>
+                </a:solidFill>
+                <a:latin typeface="Times New Roman" panose="02020603050405020304" pitchFamily="18" charset="0"/>
+                <a:cs typeface="Times New Roman" panose="02020603050405020304" pitchFamily="18" charset="0"/>
+              </a:rPr>
+              <a:t> </a:t>
             </a:r>
             <a:endParaRPr lang="pt-BR" sz="2200" dirty="0">
               <a:latin typeface="Calibri" panose="020F0502020204030204" pitchFamily="34" charset="0"/>
@@ -14950,7 +15147,7 @@
                 <a:latin typeface="Times New Roman" panose="02020603050405020304" pitchFamily="18" charset="0"/>
                 <a:cs typeface="Times New Roman" panose="02020603050405020304" pitchFamily="18" charset="0"/>
               </a:rPr>
-              <a:t>CLP Redes Industriais MODBUS 1.</a:t>
+              <a:t>O que é e como funciona o protocolo MODBUS?</a:t>
             </a:r>
           </a:p>
           <a:p>
@@ -14973,8 +15170,20 @@
                 <a:cs typeface="Times New Roman" panose="02020603050405020304" pitchFamily="18" charset="0"/>
                 <a:hlinkClick r:id="rId3"/>
               </a:rPr>
-              <a:t>https:</a:t>
-            </a:r>
+              <a:t>https://www.youtube.com/watch?v=HraRrqytB0g</a:t>
+            </a:r>
+            <a:r>
+              <a:rPr lang="pt-BR" sz="2200" dirty="0">
+                <a:latin typeface="Times New Roman" panose="02020603050405020304" pitchFamily="18" charset="0"/>
+                <a:cs typeface="Times New Roman" panose="02020603050405020304" pitchFamily="18" charset="0"/>
+              </a:rPr>
+              <a:t> </a:t>
+            </a:r>
+          </a:p>
+          <a:p>
+            <a:pPr marL="0" indent="0" algn="just">
+              <a:buNone/>
+            </a:pPr>
             <a:endParaRPr lang="pt-BR" sz="2200" dirty="0">
               <a:latin typeface="Times New Roman" panose="02020603050405020304" pitchFamily="18" charset="0"/>
               <a:cs typeface="Times New Roman" panose="02020603050405020304" pitchFamily="18" charset="0"/>
@@ -14993,43 +15202,59 @@
             <a:pPr marL="0" indent="0" algn="just">
               <a:buNone/>
             </a:pPr>
-            <a:endParaRPr lang="pt-BR" sz="2200" dirty="0">
-              <a:latin typeface="Times New Roman" panose="02020603050405020304" pitchFamily="18" charset="0"/>
-              <a:cs typeface="Times New Roman" panose="02020603050405020304" pitchFamily="18" charset="0"/>
-            </a:endParaRPr>
+            <a:r>
+              <a:rPr lang="pt-BR" sz="2200" dirty="0">
+                <a:latin typeface="Times New Roman" panose="02020603050405020304" pitchFamily="18" charset="0"/>
+                <a:cs typeface="Times New Roman" panose="02020603050405020304" pitchFamily="18" charset="0"/>
+              </a:rPr>
+              <a:t>[2] </a:t>
+            </a:r>
+            <a:r>
+              <a:rPr lang="pt-BR" sz="2200" b="1" dirty="0">
+                <a:latin typeface="Times New Roman" panose="02020603050405020304" pitchFamily="18" charset="0"/>
+                <a:cs typeface="Times New Roman" panose="02020603050405020304" pitchFamily="18" charset="0"/>
+              </a:rPr>
+              <a:t>Conheça tudo sobre o </a:t>
+            </a:r>
+            <a:r>
+              <a:rPr lang="pt-BR" sz="2200" b="1" dirty="0" err="1">
+                <a:latin typeface="Times New Roman" panose="02020603050405020304" pitchFamily="18" charset="0"/>
+                <a:cs typeface="Times New Roman" panose="02020603050405020304" pitchFamily="18" charset="0"/>
+              </a:rPr>
+              <a:t>Modbus</a:t>
+            </a:r>
+            <a:r>
+              <a:rPr lang="pt-BR" sz="2200" b="1" dirty="0">
+                <a:latin typeface="Times New Roman" panose="02020603050405020304" pitchFamily="18" charset="0"/>
+                <a:cs typeface="Times New Roman" panose="02020603050405020304" pitchFamily="18" charset="0"/>
+              </a:rPr>
+              <a:t> RTU! | VIVER DE PLC.</a:t>
+            </a:r>
           </a:p>
           <a:p>
             <a:pPr marL="0" indent="0" algn="just">
               <a:buNone/>
             </a:pPr>
             <a:r>
+              <a:rPr lang="pt-BR" sz="2200" b="1" dirty="0">
+                <a:solidFill>
+                  <a:srgbClr val="FF0000"/>
+                </a:solidFill>
+                <a:latin typeface="Times New Roman" panose="02020603050405020304" pitchFamily="18" charset="0"/>
+                <a:cs typeface="Times New Roman" panose="02020603050405020304" pitchFamily="18" charset="0"/>
+              </a:rPr>
+              <a:t>Disponível em: </a:t>
+            </a:r>
+            <a:r>
               <a:rPr lang="pt-BR" sz="2200" dirty="0">
-                <a:latin typeface="Times New Roman" panose="02020603050405020304" pitchFamily="18" charset="0"/>
-                <a:cs typeface="Times New Roman" panose="02020603050405020304" pitchFamily="18" charset="0"/>
-              </a:rPr>
-              <a:t>[2] </a:t>
-            </a:r>
-            <a:r>
-              <a:rPr lang="pt-BR" sz="2200" b="1" dirty="0">
-                <a:latin typeface="Times New Roman" panose="02020603050405020304" pitchFamily="18" charset="0"/>
-                <a:cs typeface="Times New Roman" panose="02020603050405020304" pitchFamily="18" charset="0"/>
-              </a:rPr>
-              <a:t>CLP Redes Industriais MODBUS 2.</a:t>
-            </a:r>
-          </a:p>
-          <a:p>
-            <a:pPr marL="0" indent="0" algn="just">
-              <a:buNone/>
-            </a:pPr>
-            <a:r>
-              <a:rPr lang="pt-BR" sz="2200" b="1" dirty="0">
                 <a:solidFill>
                   <a:srgbClr val="FF0000"/>
                 </a:solidFill>
                 <a:latin typeface="Times New Roman" panose="02020603050405020304" pitchFamily="18" charset="0"/>
                 <a:cs typeface="Times New Roman" panose="02020603050405020304" pitchFamily="18" charset="0"/>
-              </a:rPr>
-              <a:t>Disponível em: </a:t>
+                <a:hlinkClick r:id="rId4"/>
+              </a:rPr>
+              <a:t>https://www.youtube.com/watch?v=pKE5VSwCBZQ</a:t>
             </a:r>
             <a:r>
               <a:rPr lang="pt-BR" sz="2200" dirty="0">
@@ -15038,9 +15263,8 @@
                 </a:solidFill>
                 <a:latin typeface="Times New Roman" panose="02020603050405020304" pitchFamily="18" charset="0"/>
                 <a:cs typeface="Times New Roman" panose="02020603050405020304" pitchFamily="18" charset="0"/>
-                <a:hlinkClick r:id="rId4"/>
-              </a:rPr>
-              <a:t>https:</a:t>
+              </a:rPr>
+              <a:t> </a:t>
             </a:r>
             <a:endParaRPr lang="pt-BR" sz="2200" dirty="0">
               <a:latin typeface="Times New Roman" panose="02020603050405020304" pitchFamily="18" charset="0"/>
@@ -15263,7 +15487,7 @@
         </p:spPr>
         <p:txBody>
           <a:bodyPr>
-            <a:normAutofit/>
+            <a:normAutofit fontScale="90000"/>
           </a:bodyPr>
           <a:lstStyle/>
           <a:p>
@@ -15281,7 +15505,7 @@
                   <a:srgbClr val="0070C0"/>
                 </a:solidFill>
               </a:rPr>
-              <a:t>/</a:t>
+              <a:t> </a:t>
             </a:r>
             <a:r>
               <a:rPr lang="en-US" b="1" dirty="0" err="1">
@@ -15289,13 +15513,16 @@
                   <a:srgbClr val="0070C0"/>
                 </a:solidFill>
               </a:rPr>
-              <a:t>Atividades</a:t>
-            </a:r>
-            <a:endParaRPr lang="en-US" b="1" dirty="0">
-              <a:solidFill>
-                <a:srgbClr val="0070C0"/>
-              </a:solidFill>
-            </a:endParaRPr>
+              <a:t>Comunicação</a:t>
+            </a:r>
+            <a:r>
+              <a:rPr lang="en-US" b="1" dirty="0">
+                <a:solidFill>
+                  <a:srgbClr val="0070C0"/>
+                </a:solidFill>
+              </a:rPr>
+              <a:t> CLP com MODBUS</a:t>
+            </a:r>
           </a:p>
         </p:txBody>
       </p:sp>
@@ -15327,20 +15554,306 @@
           </a:bodyPr>
           <a:lstStyle/>
           <a:p>
+            <a:pPr marL="0" indent="0" algn="just">
+              <a:buNone/>
+            </a:pPr>
+            <a:endParaRPr lang="pt-BR" sz="2000" dirty="0">
+              <a:solidFill>
+                <a:schemeClr val="tx1"/>
+              </a:solidFill>
+              <a:latin typeface="Times New Roman" panose="02020603050405020304" pitchFamily="18" charset="0"/>
+              <a:cs typeface="Times New Roman" panose="02020603050405020304" pitchFamily="18" charset="0"/>
+            </a:endParaRPr>
+          </a:p>
+          <a:p>
+            <a:pPr marL="0" indent="0" algn="just">
+              <a:buNone/>
+            </a:pPr>
+            <a:r>
+              <a:rPr lang="pt-BR" sz="2000" dirty="0">
+                <a:solidFill>
+                  <a:schemeClr val="tx1"/>
+                </a:solidFill>
+                <a:latin typeface="Times New Roman" panose="02020603050405020304" pitchFamily="18" charset="0"/>
+                <a:cs typeface="Times New Roman" panose="02020603050405020304" pitchFamily="18" charset="0"/>
+              </a:rPr>
+              <a:t>Estabelecer comunicação </a:t>
+            </a:r>
+            <a:r>
+              <a:rPr lang="pt-BR" sz="2000" b="1" dirty="0">
+                <a:solidFill>
+                  <a:schemeClr val="tx1"/>
+                </a:solidFill>
+                <a:latin typeface="Times New Roman" panose="02020603050405020304" pitchFamily="18" charset="0"/>
+                <a:cs typeface="Times New Roman" panose="02020603050405020304" pitchFamily="18" charset="0"/>
+              </a:rPr>
+              <a:t>MODBUS</a:t>
+            </a:r>
+            <a:r>
+              <a:rPr lang="pt-BR" sz="2000" dirty="0">
+                <a:solidFill>
+                  <a:schemeClr val="tx1"/>
+                </a:solidFill>
+                <a:latin typeface="Times New Roman" panose="02020603050405020304" pitchFamily="18" charset="0"/>
+                <a:cs typeface="Times New Roman" panose="02020603050405020304" pitchFamily="18" charset="0"/>
+              </a:rPr>
+              <a:t> entre um CLP (</a:t>
+            </a:r>
+            <a:r>
+              <a:rPr lang="pt-BR" sz="2000" b="1" dirty="0">
+                <a:solidFill>
+                  <a:schemeClr val="tx1"/>
+                </a:solidFill>
+                <a:latin typeface="Times New Roman" panose="02020603050405020304" pitchFamily="18" charset="0"/>
+                <a:cs typeface="Times New Roman" panose="02020603050405020304" pitchFamily="18" charset="0"/>
+              </a:rPr>
+              <a:t>mestre</a:t>
+            </a:r>
+            <a:r>
+              <a:rPr lang="pt-BR" sz="2000" dirty="0">
+                <a:solidFill>
+                  <a:schemeClr val="tx1"/>
+                </a:solidFill>
+                <a:latin typeface="Times New Roman" panose="02020603050405020304" pitchFamily="18" charset="0"/>
+                <a:cs typeface="Times New Roman" panose="02020603050405020304" pitchFamily="18" charset="0"/>
+              </a:rPr>
+              <a:t>) e um dispositivo </a:t>
+            </a:r>
+            <a:r>
+              <a:rPr lang="pt-BR" sz="2000" b="1" dirty="0">
+                <a:solidFill>
+                  <a:srgbClr val="FF0000"/>
+                </a:solidFill>
+                <a:latin typeface="Times New Roman" panose="02020603050405020304" pitchFamily="18" charset="0"/>
+                <a:cs typeface="Times New Roman" panose="02020603050405020304" pitchFamily="18" charset="0"/>
+              </a:rPr>
+              <a:t>escravo</a:t>
+            </a:r>
+            <a:r>
+              <a:rPr lang="pt-BR" sz="2000" dirty="0">
+                <a:solidFill>
+                  <a:schemeClr val="tx1"/>
+                </a:solidFill>
+                <a:latin typeface="Times New Roman" panose="02020603050405020304" pitchFamily="18" charset="0"/>
+                <a:cs typeface="Times New Roman" panose="02020603050405020304" pitchFamily="18" charset="0"/>
+              </a:rPr>
+              <a:t> (simulador ou outro CLP).</a:t>
+            </a:r>
+          </a:p>
+          <a:p>
+            <a:pPr marL="0" indent="0" algn="just">
+              <a:buNone/>
+            </a:pPr>
+            <a:endParaRPr lang="pt-BR" sz="2000" dirty="0">
+              <a:solidFill>
+                <a:schemeClr val="tx1"/>
+              </a:solidFill>
+              <a:latin typeface="Times New Roman" panose="02020603050405020304" pitchFamily="18" charset="0"/>
+              <a:cs typeface="Times New Roman" panose="02020603050405020304" pitchFamily="18" charset="0"/>
+            </a:endParaRPr>
+          </a:p>
+          <a:p>
             <a:pPr algn="just">
               <a:buFont typeface="Wingdings" panose="05000000000000000000" pitchFamily="2" charset="2"/>
-              <a:buChar char="q"/>
-            </a:pPr>
-            <a:r>
-              <a:rPr lang="pt-BR" sz="2200" b="1" dirty="0">
-                <a:solidFill>
-                  <a:srgbClr val="0070C0"/>
-                </a:solidFill>
-                <a:latin typeface="Times New Roman" panose="02020603050405020304" pitchFamily="18" charset="0"/>
-                <a:cs typeface="Times New Roman" panose="02020603050405020304" pitchFamily="18" charset="0"/>
-              </a:rPr>
-              <a:t>CLP</a:t>
-            </a:r>
+              <a:buChar char="§"/>
+            </a:pPr>
+            <a:r>
+              <a:rPr lang="pt-BR" sz="2000" dirty="0">
+                <a:solidFill>
+                  <a:schemeClr val="tx1"/>
+                </a:solidFill>
+                <a:latin typeface="Times New Roman" panose="02020603050405020304" pitchFamily="18" charset="0"/>
+                <a:cs typeface="Times New Roman" panose="02020603050405020304" pitchFamily="18" charset="0"/>
+              </a:rPr>
+              <a:t>CLP mestre configurado para ler um registrador do escravo</a:t>
+            </a:r>
+          </a:p>
+          <a:p>
+            <a:pPr algn="just">
+              <a:buFont typeface="Wingdings" panose="05000000000000000000" pitchFamily="2" charset="2"/>
+              <a:buChar char="§"/>
+            </a:pPr>
+            <a:r>
+              <a:rPr lang="pt-BR" sz="2000" dirty="0">
+                <a:solidFill>
+                  <a:schemeClr val="tx1"/>
+                </a:solidFill>
+                <a:latin typeface="Times New Roman" panose="02020603050405020304" pitchFamily="18" charset="0"/>
+                <a:cs typeface="Times New Roman" panose="02020603050405020304" pitchFamily="18" charset="0"/>
+              </a:rPr>
+              <a:t>Visualização em tempo real com </a:t>
+            </a:r>
+            <a:r>
+              <a:rPr lang="pt-BR" sz="2000" dirty="0" err="1">
+                <a:solidFill>
+                  <a:schemeClr val="tx1"/>
+                </a:solidFill>
+                <a:latin typeface="Times New Roman" panose="02020603050405020304" pitchFamily="18" charset="0"/>
+                <a:cs typeface="Times New Roman" panose="02020603050405020304" pitchFamily="18" charset="0"/>
+              </a:rPr>
+              <a:t>Modbus</a:t>
+            </a:r>
+            <a:r>
+              <a:rPr lang="pt-BR" sz="2000" dirty="0">
+                <a:solidFill>
+                  <a:schemeClr val="tx1"/>
+                </a:solidFill>
+                <a:latin typeface="Times New Roman" panose="02020603050405020304" pitchFamily="18" charset="0"/>
+                <a:cs typeface="Times New Roman" panose="02020603050405020304" pitchFamily="18" charset="0"/>
+              </a:rPr>
+              <a:t> Poll / </a:t>
+            </a:r>
+            <a:r>
+              <a:rPr lang="pt-BR" sz="2000" dirty="0" err="1">
+                <a:solidFill>
+                  <a:schemeClr val="tx1"/>
+                </a:solidFill>
+                <a:latin typeface="Times New Roman" panose="02020603050405020304" pitchFamily="18" charset="0"/>
+                <a:cs typeface="Times New Roman" panose="02020603050405020304" pitchFamily="18" charset="0"/>
+              </a:rPr>
+              <a:t>Codesys</a:t>
+            </a:r>
+            <a:endParaRPr lang="pt-BR" sz="2000" dirty="0">
+              <a:solidFill>
+                <a:schemeClr val="tx1"/>
+              </a:solidFill>
+              <a:latin typeface="Times New Roman" panose="02020603050405020304" pitchFamily="18" charset="0"/>
+              <a:cs typeface="Times New Roman" panose="02020603050405020304" pitchFamily="18" charset="0"/>
+            </a:endParaRPr>
+          </a:p>
+          <a:p>
+            <a:pPr marL="0" indent="0" algn="just">
+              <a:buNone/>
+            </a:pPr>
+            <a:endParaRPr lang="pt-BR" sz="2000" dirty="0">
+              <a:solidFill>
+                <a:schemeClr val="tx1"/>
+              </a:solidFill>
+              <a:latin typeface="Times New Roman" panose="02020603050405020304" pitchFamily="18" charset="0"/>
+              <a:cs typeface="Times New Roman" panose="02020603050405020304" pitchFamily="18" charset="0"/>
+            </a:endParaRPr>
+          </a:p>
+          <a:p>
+            <a:pPr marL="0" indent="0" algn="just">
+              <a:buNone/>
+            </a:pPr>
+            <a:r>
+              <a:rPr lang="pt-BR" sz="2000" b="1" dirty="0">
+                <a:solidFill>
+                  <a:schemeClr val="tx1"/>
+                </a:solidFill>
+                <a:latin typeface="Times New Roman" panose="02020603050405020304" pitchFamily="18" charset="0"/>
+                <a:cs typeface="Times New Roman" panose="02020603050405020304" pitchFamily="18" charset="0"/>
+              </a:rPr>
+              <a:t>Materiais</a:t>
+            </a:r>
+            <a:r>
+              <a:rPr lang="pt-BR" sz="2000" dirty="0">
+                <a:solidFill>
+                  <a:schemeClr val="tx1"/>
+                </a:solidFill>
+                <a:latin typeface="Times New Roman" panose="02020603050405020304" pitchFamily="18" charset="0"/>
+                <a:cs typeface="Times New Roman" panose="02020603050405020304" pitchFamily="18" charset="0"/>
+              </a:rPr>
+              <a:t>:</a:t>
+            </a:r>
+          </a:p>
+          <a:p>
+            <a:pPr marL="0" indent="0" algn="just">
+              <a:buNone/>
+            </a:pPr>
+            <a:r>
+              <a:rPr lang="pt-BR" sz="2000" dirty="0">
+                <a:solidFill>
+                  <a:schemeClr val="tx1"/>
+                </a:solidFill>
+                <a:latin typeface="Times New Roman" panose="02020603050405020304" pitchFamily="18" charset="0"/>
+                <a:cs typeface="Times New Roman" panose="02020603050405020304" pitchFamily="18" charset="0"/>
+              </a:rPr>
+              <a:t>•	Software: </a:t>
+            </a:r>
+            <a:r>
+              <a:rPr lang="pt-BR" sz="2000" dirty="0" err="1">
+                <a:solidFill>
+                  <a:schemeClr val="tx1"/>
+                </a:solidFill>
+                <a:latin typeface="Times New Roman" panose="02020603050405020304" pitchFamily="18" charset="0"/>
+                <a:cs typeface="Times New Roman" panose="02020603050405020304" pitchFamily="18" charset="0"/>
+              </a:rPr>
+              <a:t>Codesys</a:t>
+            </a:r>
+            <a:r>
+              <a:rPr lang="pt-BR" sz="2000" dirty="0">
+                <a:solidFill>
+                  <a:schemeClr val="tx1"/>
+                </a:solidFill>
+                <a:latin typeface="Times New Roman" panose="02020603050405020304" pitchFamily="18" charset="0"/>
+                <a:cs typeface="Times New Roman" panose="02020603050405020304" pitchFamily="18" charset="0"/>
+              </a:rPr>
+              <a:t>, </a:t>
+            </a:r>
+            <a:r>
+              <a:rPr lang="pt-BR" sz="2000" dirty="0" err="1">
+                <a:solidFill>
+                  <a:schemeClr val="tx1"/>
+                </a:solidFill>
+                <a:latin typeface="Times New Roman" panose="02020603050405020304" pitchFamily="18" charset="0"/>
+                <a:cs typeface="Times New Roman" panose="02020603050405020304" pitchFamily="18" charset="0"/>
+              </a:rPr>
+              <a:t>Modbus</a:t>
+            </a:r>
+            <a:r>
+              <a:rPr lang="pt-BR" sz="2000" dirty="0">
+                <a:solidFill>
+                  <a:schemeClr val="tx1"/>
+                </a:solidFill>
+                <a:latin typeface="Times New Roman" panose="02020603050405020304" pitchFamily="18" charset="0"/>
+                <a:cs typeface="Times New Roman" panose="02020603050405020304" pitchFamily="18" charset="0"/>
+              </a:rPr>
+              <a:t> Poll ou TIA Portal + PLCSIM</a:t>
+            </a:r>
+          </a:p>
+          <a:p>
+            <a:pPr marL="0" indent="0" algn="just">
+              <a:buNone/>
+            </a:pPr>
+            <a:r>
+              <a:rPr lang="pt-BR" sz="2000" dirty="0">
+                <a:solidFill>
+                  <a:schemeClr val="tx1"/>
+                </a:solidFill>
+                <a:latin typeface="Times New Roman" panose="02020603050405020304" pitchFamily="18" charset="0"/>
+                <a:cs typeface="Times New Roman" panose="02020603050405020304" pitchFamily="18" charset="0"/>
+              </a:rPr>
+              <a:t>•	CLP real ou simulado</a:t>
+            </a:r>
+          </a:p>
+          <a:p>
+            <a:pPr marL="0" indent="0" algn="just">
+              <a:buNone/>
+            </a:pPr>
+            <a:r>
+              <a:rPr lang="pt-BR" sz="2000" dirty="0">
+                <a:solidFill>
+                  <a:schemeClr val="tx1"/>
+                </a:solidFill>
+                <a:latin typeface="Times New Roman" panose="02020603050405020304" pitchFamily="18" charset="0"/>
+                <a:cs typeface="Times New Roman" panose="02020603050405020304" pitchFamily="18" charset="0"/>
+              </a:rPr>
+              <a:t>•	Cabo RS-485 ou rede Ethernet (se for TCP)</a:t>
+            </a:r>
+          </a:p>
+          <a:p>
+            <a:pPr marL="0" indent="0" algn="just">
+              <a:buNone/>
+            </a:pPr>
+            <a:endParaRPr lang="pt-BR" sz="2000" dirty="0">
+              <a:solidFill>
+                <a:schemeClr val="tx1"/>
+              </a:solidFill>
+              <a:latin typeface="Times New Roman" panose="02020603050405020304" pitchFamily="18" charset="0"/>
+              <a:cs typeface="Times New Roman" panose="02020603050405020304" pitchFamily="18" charset="0"/>
+            </a:endParaRPr>
           </a:p>
         </p:txBody>
       </p:sp>
@@ -15359,6 +15872,686 @@
 </file>
 
 <file path=ppt/slides/slide31.xml><?xml version="1.0" encoding="utf-8"?>
+<p:sld xmlns:a="http://schemas.openxmlformats.org/drawingml/2006/main" xmlns:r="http://schemas.openxmlformats.org/officeDocument/2006/relationships" xmlns:p="http://schemas.openxmlformats.org/presentationml/2006/main">
+  <p:cSld>
+    <p:spTree>
+      <p:nvGrpSpPr>
+        <p:cNvPr id="1" name="">
+          <a:extLst>
+            <a:ext uri="{FF2B5EF4-FFF2-40B4-BE49-F238E27FC236}">
+              <a16:creationId xmlns:a16="http://schemas.microsoft.com/office/drawing/2014/main" id="{A7CD589B-1316-C27A-6200-6CA7F467AD34}"/>
+            </a:ext>
+          </a:extLst>
+        </p:cNvPr>
+        <p:cNvGrpSpPr/>
+        <p:nvPr/>
+      </p:nvGrpSpPr>
+      <p:grpSpPr>
+        <a:xfrm>
+          <a:off x="0" y="0"/>
+          <a:ext cx="0" cy="0"/>
+          <a:chOff x="0" y="0"/>
+          <a:chExt cx="0" cy="0"/>
+        </a:xfrm>
+      </p:grpSpPr>
+      <p:sp>
+        <p:nvSpPr>
+          <p:cNvPr id="6" name="Title 1">
+            <a:extLst>
+              <a:ext uri="{FF2B5EF4-FFF2-40B4-BE49-F238E27FC236}">
+                <a16:creationId xmlns:a16="http://schemas.microsoft.com/office/drawing/2014/main" id="{F4B3EBCD-B8E5-6764-4765-51419B10877D}"/>
+              </a:ext>
+            </a:extLst>
+          </p:cNvPr>
+          <p:cNvSpPr>
+            <a:spLocks noGrp="1"/>
+          </p:cNvSpPr>
+          <p:nvPr>
+            <p:ph type="title"/>
+          </p:nvPr>
+        </p:nvSpPr>
+        <p:spPr>
+          <a:xfrm>
+            <a:off x="457200" y="205980"/>
+            <a:ext cx="8229600" cy="857251"/>
+          </a:xfrm>
+        </p:spPr>
+        <p:txBody>
+          <a:bodyPr>
+            <a:normAutofit/>
+          </a:bodyPr>
+          <a:lstStyle/>
+          <a:p>
+            <a:r>
+              <a:rPr lang="en-US" b="1" dirty="0" err="1">
+                <a:solidFill>
+                  <a:srgbClr val="0070C0"/>
+                </a:solidFill>
+              </a:rPr>
+              <a:t>Dinâmica</a:t>
+            </a:r>
+            <a:r>
+              <a:rPr lang="en-US" b="1" dirty="0">
+                <a:solidFill>
+                  <a:srgbClr val="0070C0"/>
+                </a:solidFill>
+              </a:rPr>
+              <a:t>/</a:t>
+            </a:r>
+            <a:r>
+              <a:rPr lang="en-US" b="1" dirty="0" err="1">
+                <a:solidFill>
+                  <a:srgbClr val="0070C0"/>
+                </a:solidFill>
+              </a:rPr>
+              <a:t>Atividades</a:t>
+            </a:r>
+            <a:endParaRPr lang="en-US" b="1" dirty="0">
+              <a:solidFill>
+                <a:srgbClr val="0070C0"/>
+              </a:solidFill>
+            </a:endParaRPr>
+          </a:p>
+        </p:txBody>
+      </p:sp>
+      <p:sp>
+        <p:nvSpPr>
+          <p:cNvPr id="8" name="Text Placeholder 2">
+            <a:extLst>
+              <a:ext uri="{FF2B5EF4-FFF2-40B4-BE49-F238E27FC236}">
+                <a16:creationId xmlns:a16="http://schemas.microsoft.com/office/drawing/2014/main" id="{4664540C-6B50-7105-748A-5D16838322EE}"/>
+              </a:ext>
+            </a:extLst>
+          </p:cNvPr>
+          <p:cNvSpPr>
+            <a:spLocks noGrp="1"/>
+          </p:cNvSpPr>
+          <p:nvPr>
+            <p:ph type="body" sz="half" idx="1"/>
+          </p:nvPr>
+        </p:nvSpPr>
+        <p:spPr>
+          <a:xfrm>
+            <a:off x="142865" y="1035050"/>
+            <a:ext cx="8865056" cy="3994150"/>
+          </a:xfrm>
+        </p:spPr>
+        <p:txBody>
+          <a:bodyPr>
+            <a:noAutofit/>
+          </a:bodyPr>
+          <a:lstStyle/>
+          <a:p>
+            <a:pPr marL="0" indent="0" algn="just">
+              <a:buNone/>
+            </a:pPr>
+            <a:r>
+              <a:rPr lang="pt-BR" sz="2000" b="1" dirty="0">
+                <a:solidFill>
+                  <a:schemeClr val="tx1"/>
+                </a:solidFill>
+                <a:latin typeface="Times New Roman" panose="02020603050405020304" pitchFamily="18" charset="0"/>
+                <a:cs typeface="Times New Roman" panose="02020603050405020304" pitchFamily="18" charset="0"/>
+              </a:rPr>
+              <a:t>1. Configuração do Mestre (CLP)</a:t>
+            </a:r>
+          </a:p>
+          <a:p>
+            <a:pPr marL="0" indent="0" algn="just">
+              <a:buNone/>
+            </a:pPr>
+            <a:r>
+              <a:rPr lang="pt-BR" sz="2000" dirty="0">
+                <a:solidFill>
+                  <a:schemeClr val="tx1"/>
+                </a:solidFill>
+                <a:latin typeface="Times New Roman" panose="02020603050405020304" pitchFamily="18" charset="0"/>
+                <a:cs typeface="Times New Roman" panose="02020603050405020304" pitchFamily="18" charset="0"/>
+              </a:rPr>
+              <a:t>•	Configurar protocolo MODBUS mestre</a:t>
+            </a:r>
+          </a:p>
+          <a:p>
+            <a:pPr marL="0" indent="0" algn="just">
+              <a:buNone/>
+            </a:pPr>
+            <a:r>
+              <a:rPr lang="pt-BR" sz="2000" dirty="0">
+                <a:solidFill>
+                  <a:schemeClr val="tx1"/>
+                </a:solidFill>
+                <a:latin typeface="Times New Roman" panose="02020603050405020304" pitchFamily="18" charset="0"/>
+                <a:cs typeface="Times New Roman" panose="02020603050405020304" pitchFamily="18" charset="0"/>
+              </a:rPr>
+              <a:t>•	Definir endereço do escravo (</a:t>
+            </a:r>
+            <a:r>
+              <a:rPr lang="pt-BR" sz="2000" dirty="0" err="1">
+                <a:solidFill>
+                  <a:schemeClr val="tx1"/>
+                </a:solidFill>
+                <a:latin typeface="Times New Roman" panose="02020603050405020304" pitchFamily="18" charset="0"/>
+                <a:cs typeface="Times New Roman" panose="02020603050405020304" pitchFamily="18" charset="0"/>
+              </a:rPr>
+              <a:t>ex</a:t>
+            </a:r>
+            <a:r>
+              <a:rPr lang="pt-BR" sz="2000" dirty="0">
+                <a:solidFill>
+                  <a:schemeClr val="tx1"/>
+                </a:solidFill>
+                <a:latin typeface="Times New Roman" panose="02020603050405020304" pitchFamily="18" charset="0"/>
+                <a:cs typeface="Times New Roman" panose="02020603050405020304" pitchFamily="18" charset="0"/>
+              </a:rPr>
+              <a:t>: 1)</a:t>
+            </a:r>
+          </a:p>
+          <a:p>
+            <a:pPr marL="0" indent="0" algn="just">
+              <a:buNone/>
+            </a:pPr>
+            <a:r>
+              <a:rPr lang="pt-BR" sz="2000" dirty="0">
+                <a:solidFill>
+                  <a:schemeClr val="tx1"/>
+                </a:solidFill>
+                <a:latin typeface="Times New Roman" panose="02020603050405020304" pitchFamily="18" charset="0"/>
+                <a:cs typeface="Times New Roman" panose="02020603050405020304" pitchFamily="18" charset="0"/>
+              </a:rPr>
+              <a:t>•	Escolher função (</a:t>
+            </a:r>
+            <a:r>
+              <a:rPr lang="pt-BR" sz="2000" dirty="0" err="1">
+                <a:solidFill>
+                  <a:schemeClr val="tx1"/>
+                </a:solidFill>
+                <a:latin typeface="Times New Roman" panose="02020603050405020304" pitchFamily="18" charset="0"/>
+                <a:cs typeface="Times New Roman" panose="02020603050405020304" pitchFamily="18" charset="0"/>
+              </a:rPr>
+              <a:t>ex</a:t>
+            </a:r>
+            <a:r>
+              <a:rPr lang="pt-BR" sz="2000" dirty="0">
+                <a:solidFill>
+                  <a:schemeClr val="tx1"/>
+                </a:solidFill>
+                <a:latin typeface="Times New Roman" panose="02020603050405020304" pitchFamily="18" charset="0"/>
+                <a:cs typeface="Times New Roman" panose="02020603050405020304" pitchFamily="18" charset="0"/>
+              </a:rPr>
+              <a:t>: leitura de Holding Register 40001)</a:t>
+            </a:r>
+          </a:p>
+          <a:p>
+            <a:pPr marL="0" indent="0" algn="just">
+              <a:buNone/>
+            </a:pPr>
+            <a:r>
+              <a:rPr lang="pt-BR" sz="2000" dirty="0">
+                <a:solidFill>
+                  <a:schemeClr val="tx1"/>
+                </a:solidFill>
+                <a:latin typeface="Times New Roman" panose="02020603050405020304" pitchFamily="18" charset="0"/>
+                <a:cs typeface="Times New Roman" panose="02020603050405020304" pitchFamily="18" charset="0"/>
+              </a:rPr>
+              <a:t>•	Definir taxa de </a:t>
+            </a:r>
+            <a:r>
+              <a:rPr lang="pt-BR" sz="2000" dirty="0" err="1">
+                <a:solidFill>
+                  <a:schemeClr val="tx1"/>
+                </a:solidFill>
+                <a:latin typeface="Times New Roman" panose="02020603050405020304" pitchFamily="18" charset="0"/>
+                <a:cs typeface="Times New Roman" panose="02020603050405020304" pitchFamily="18" charset="0"/>
+              </a:rPr>
+              <a:t>baud</a:t>
+            </a:r>
+            <a:r>
+              <a:rPr lang="pt-BR" sz="2000" dirty="0">
+                <a:solidFill>
+                  <a:schemeClr val="tx1"/>
+                </a:solidFill>
+                <a:latin typeface="Times New Roman" panose="02020603050405020304" pitchFamily="18" charset="0"/>
+                <a:cs typeface="Times New Roman" panose="02020603050405020304" pitchFamily="18" charset="0"/>
+              </a:rPr>
+              <a:t>, paridade, stop bits (RTU) ou IP (TCP)</a:t>
+            </a:r>
+          </a:p>
+          <a:p>
+            <a:pPr marL="0" indent="0" algn="just">
+              <a:buNone/>
+            </a:pPr>
+            <a:endParaRPr lang="pt-BR" sz="2000" b="1" dirty="0">
+              <a:solidFill>
+                <a:schemeClr val="tx1"/>
+              </a:solidFill>
+              <a:latin typeface="Times New Roman" panose="02020603050405020304" pitchFamily="18" charset="0"/>
+              <a:cs typeface="Times New Roman" panose="02020603050405020304" pitchFamily="18" charset="0"/>
+            </a:endParaRPr>
+          </a:p>
+          <a:p>
+            <a:pPr marL="0" indent="0" algn="just">
+              <a:buNone/>
+            </a:pPr>
+            <a:r>
+              <a:rPr lang="pt-BR" sz="2000" b="1" dirty="0">
+                <a:solidFill>
+                  <a:schemeClr val="tx1"/>
+                </a:solidFill>
+                <a:latin typeface="Times New Roman" panose="02020603050405020304" pitchFamily="18" charset="0"/>
+                <a:cs typeface="Times New Roman" panose="02020603050405020304" pitchFamily="18" charset="0"/>
+              </a:rPr>
+              <a:t>2. Configuração do Escravo</a:t>
+            </a:r>
+          </a:p>
+          <a:p>
+            <a:pPr marL="0" indent="0" algn="just">
+              <a:buNone/>
+            </a:pPr>
+            <a:r>
+              <a:rPr lang="pt-BR" sz="2000" dirty="0">
+                <a:solidFill>
+                  <a:schemeClr val="tx1"/>
+                </a:solidFill>
+                <a:latin typeface="Times New Roman" panose="02020603050405020304" pitchFamily="18" charset="0"/>
+                <a:cs typeface="Times New Roman" panose="02020603050405020304" pitchFamily="18" charset="0"/>
+              </a:rPr>
+              <a:t>•	Definir dados no registrador de retenção (</a:t>
+            </a:r>
+            <a:r>
+              <a:rPr lang="pt-BR" sz="2000" dirty="0" err="1">
+                <a:solidFill>
+                  <a:schemeClr val="tx1"/>
+                </a:solidFill>
+                <a:latin typeface="Times New Roman" panose="02020603050405020304" pitchFamily="18" charset="0"/>
+                <a:cs typeface="Times New Roman" panose="02020603050405020304" pitchFamily="18" charset="0"/>
+              </a:rPr>
+              <a:t>ex</a:t>
+            </a:r>
+            <a:r>
+              <a:rPr lang="pt-BR" sz="2000" dirty="0">
+                <a:solidFill>
+                  <a:schemeClr val="tx1"/>
+                </a:solidFill>
+                <a:latin typeface="Times New Roman" panose="02020603050405020304" pitchFamily="18" charset="0"/>
+                <a:cs typeface="Times New Roman" panose="02020603050405020304" pitchFamily="18" charset="0"/>
+              </a:rPr>
+              <a:t>: valor de temperatura = 250)</a:t>
+            </a:r>
+          </a:p>
+          <a:p>
+            <a:pPr marL="0" indent="0" algn="just">
+              <a:buNone/>
+            </a:pPr>
+            <a:r>
+              <a:rPr lang="pt-BR" sz="2000" dirty="0">
+                <a:solidFill>
+                  <a:schemeClr val="tx1"/>
+                </a:solidFill>
+                <a:latin typeface="Times New Roman" panose="02020603050405020304" pitchFamily="18" charset="0"/>
+                <a:cs typeface="Times New Roman" panose="02020603050405020304" pitchFamily="18" charset="0"/>
+              </a:rPr>
+              <a:t>•	Habilitar respostas MODBUS no simulador (ou CLP escravo)</a:t>
+            </a:r>
+          </a:p>
+          <a:p>
+            <a:pPr marL="0" indent="0" algn="just">
+              <a:buNone/>
+            </a:pPr>
+            <a:endParaRPr lang="pt-BR" sz="2000" dirty="0">
+              <a:solidFill>
+                <a:schemeClr val="tx1"/>
+              </a:solidFill>
+              <a:latin typeface="Times New Roman" panose="02020603050405020304" pitchFamily="18" charset="0"/>
+              <a:cs typeface="Times New Roman" panose="02020603050405020304" pitchFamily="18" charset="0"/>
+            </a:endParaRPr>
+          </a:p>
+        </p:txBody>
+      </p:sp>
+    </p:spTree>
+    <p:extLst>
+      <p:ext uri="{BB962C8B-B14F-4D97-AF65-F5344CB8AC3E}">
+        <p14:creationId xmlns:p14="http://schemas.microsoft.com/office/powerpoint/2010/main" val="437659174"/>
+      </p:ext>
+    </p:extLst>
+  </p:cSld>
+  <p:clrMapOvr>
+    <a:masterClrMapping/>
+  </p:clrMapOvr>
+  <p:transition spd="med"/>
+</p:sld>
+</file>
+
+<file path=ppt/slides/slide32.xml><?xml version="1.0" encoding="utf-8"?>
+<p:sld xmlns:a="http://schemas.openxmlformats.org/drawingml/2006/main" xmlns:r="http://schemas.openxmlformats.org/officeDocument/2006/relationships" xmlns:p="http://schemas.openxmlformats.org/presentationml/2006/main">
+  <p:cSld>
+    <p:spTree>
+      <p:nvGrpSpPr>
+        <p:cNvPr id="1" name="">
+          <a:extLst>
+            <a:ext uri="{FF2B5EF4-FFF2-40B4-BE49-F238E27FC236}">
+              <a16:creationId xmlns:a16="http://schemas.microsoft.com/office/drawing/2014/main" id="{8580C550-14AA-1243-22BC-A6561861D0A0}"/>
+            </a:ext>
+          </a:extLst>
+        </p:cNvPr>
+        <p:cNvGrpSpPr/>
+        <p:nvPr/>
+      </p:nvGrpSpPr>
+      <p:grpSpPr>
+        <a:xfrm>
+          <a:off x="0" y="0"/>
+          <a:ext cx="0" cy="0"/>
+          <a:chOff x="0" y="0"/>
+          <a:chExt cx="0" cy="0"/>
+        </a:xfrm>
+      </p:grpSpPr>
+      <p:sp>
+        <p:nvSpPr>
+          <p:cNvPr id="6" name="Title 1">
+            <a:extLst>
+              <a:ext uri="{FF2B5EF4-FFF2-40B4-BE49-F238E27FC236}">
+                <a16:creationId xmlns:a16="http://schemas.microsoft.com/office/drawing/2014/main" id="{2DF23597-3C76-17C8-922D-80B55BAA6805}"/>
+              </a:ext>
+            </a:extLst>
+          </p:cNvPr>
+          <p:cNvSpPr>
+            <a:spLocks noGrp="1"/>
+          </p:cNvSpPr>
+          <p:nvPr>
+            <p:ph type="title"/>
+          </p:nvPr>
+        </p:nvSpPr>
+        <p:spPr>
+          <a:xfrm>
+            <a:off x="457200" y="205980"/>
+            <a:ext cx="8229600" cy="857251"/>
+          </a:xfrm>
+        </p:spPr>
+        <p:txBody>
+          <a:bodyPr>
+            <a:normAutofit/>
+          </a:bodyPr>
+          <a:lstStyle/>
+          <a:p>
+            <a:r>
+              <a:rPr lang="en-US" b="1" dirty="0" err="1">
+                <a:solidFill>
+                  <a:srgbClr val="0070C0"/>
+                </a:solidFill>
+              </a:rPr>
+              <a:t>Dinâmica</a:t>
+            </a:r>
+            <a:r>
+              <a:rPr lang="en-US" b="1" dirty="0">
+                <a:solidFill>
+                  <a:srgbClr val="0070C0"/>
+                </a:solidFill>
+              </a:rPr>
+              <a:t>/</a:t>
+            </a:r>
+            <a:r>
+              <a:rPr lang="en-US" b="1" dirty="0" err="1">
+                <a:solidFill>
+                  <a:srgbClr val="0070C0"/>
+                </a:solidFill>
+              </a:rPr>
+              <a:t>Atividades</a:t>
+            </a:r>
+            <a:endParaRPr lang="en-US" b="1" dirty="0">
+              <a:solidFill>
+                <a:srgbClr val="0070C0"/>
+              </a:solidFill>
+            </a:endParaRPr>
+          </a:p>
+        </p:txBody>
+      </p:sp>
+      <p:sp>
+        <p:nvSpPr>
+          <p:cNvPr id="8" name="Text Placeholder 2">
+            <a:extLst>
+              <a:ext uri="{FF2B5EF4-FFF2-40B4-BE49-F238E27FC236}">
+                <a16:creationId xmlns:a16="http://schemas.microsoft.com/office/drawing/2014/main" id="{3C997CA9-2305-5981-F4C7-E7749017F76A}"/>
+              </a:ext>
+            </a:extLst>
+          </p:cNvPr>
+          <p:cNvSpPr>
+            <a:spLocks noGrp="1"/>
+          </p:cNvSpPr>
+          <p:nvPr>
+            <p:ph type="body" sz="half" idx="1"/>
+          </p:nvPr>
+        </p:nvSpPr>
+        <p:spPr>
+          <a:xfrm>
+            <a:off x="142865" y="1035050"/>
+            <a:ext cx="8865056" cy="3994150"/>
+          </a:xfrm>
+        </p:spPr>
+        <p:txBody>
+          <a:bodyPr>
+            <a:noAutofit/>
+          </a:bodyPr>
+          <a:lstStyle/>
+          <a:p>
+            <a:pPr marL="0" indent="0" algn="just">
+              <a:buNone/>
+            </a:pPr>
+            <a:r>
+              <a:rPr lang="pt-BR" sz="2000" b="1" dirty="0">
+                <a:solidFill>
+                  <a:schemeClr val="tx1"/>
+                </a:solidFill>
+                <a:latin typeface="Times New Roman" panose="02020603050405020304" pitchFamily="18" charset="0"/>
+                <a:cs typeface="Times New Roman" panose="02020603050405020304" pitchFamily="18" charset="0"/>
+              </a:rPr>
+              <a:t>3. Monitoramento</a:t>
+            </a:r>
+          </a:p>
+          <a:p>
+            <a:pPr marL="0" indent="0" algn="just">
+              <a:buNone/>
+            </a:pPr>
+            <a:r>
+              <a:rPr lang="pt-BR" sz="2000" dirty="0">
+                <a:solidFill>
+                  <a:schemeClr val="tx1"/>
+                </a:solidFill>
+                <a:latin typeface="Times New Roman" panose="02020603050405020304" pitchFamily="18" charset="0"/>
+                <a:cs typeface="Times New Roman" panose="02020603050405020304" pitchFamily="18" charset="0"/>
+              </a:rPr>
+              <a:t>•	Usar ferramenta (</a:t>
+            </a:r>
+            <a:r>
+              <a:rPr lang="pt-BR" sz="2000" dirty="0" err="1">
+                <a:solidFill>
+                  <a:schemeClr val="tx1"/>
+                </a:solidFill>
+                <a:latin typeface="Times New Roman" panose="02020603050405020304" pitchFamily="18" charset="0"/>
+                <a:cs typeface="Times New Roman" panose="02020603050405020304" pitchFamily="18" charset="0"/>
+              </a:rPr>
+              <a:t>ex</a:t>
+            </a:r>
+            <a:r>
+              <a:rPr lang="pt-BR" sz="2000" dirty="0">
+                <a:solidFill>
+                  <a:schemeClr val="tx1"/>
+                </a:solidFill>
+                <a:latin typeface="Times New Roman" panose="02020603050405020304" pitchFamily="18" charset="0"/>
+                <a:cs typeface="Times New Roman" panose="02020603050405020304" pitchFamily="18" charset="0"/>
+              </a:rPr>
+              <a:t>: </a:t>
+            </a:r>
+            <a:r>
+              <a:rPr lang="pt-BR" sz="2000" dirty="0" err="1">
+                <a:solidFill>
+                  <a:schemeClr val="tx1"/>
+                </a:solidFill>
+                <a:latin typeface="Times New Roman" panose="02020603050405020304" pitchFamily="18" charset="0"/>
+                <a:cs typeface="Times New Roman" panose="02020603050405020304" pitchFamily="18" charset="0"/>
+              </a:rPr>
+              <a:t>Modbus</a:t>
+            </a:r>
+            <a:r>
+              <a:rPr lang="pt-BR" sz="2000" dirty="0">
+                <a:solidFill>
+                  <a:schemeClr val="tx1"/>
+                </a:solidFill>
+                <a:latin typeface="Times New Roman" panose="02020603050405020304" pitchFamily="18" charset="0"/>
+                <a:cs typeface="Times New Roman" panose="02020603050405020304" pitchFamily="18" charset="0"/>
+              </a:rPr>
+              <a:t> Poll) para visualizar:</a:t>
+            </a:r>
+          </a:p>
+          <a:p>
+            <a:pPr marL="0" indent="0" algn="just">
+              <a:buNone/>
+            </a:pPr>
+            <a:r>
+              <a:rPr lang="pt-BR" sz="2000" dirty="0">
+                <a:solidFill>
+                  <a:schemeClr val="tx1"/>
+                </a:solidFill>
+                <a:latin typeface="Times New Roman" panose="02020603050405020304" pitchFamily="18" charset="0"/>
+                <a:cs typeface="Times New Roman" panose="02020603050405020304" pitchFamily="18" charset="0"/>
+              </a:rPr>
+              <a:t>•	Envio da solicitação</a:t>
+            </a:r>
+          </a:p>
+          <a:p>
+            <a:pPr marL="0" indent="0" algn="just">
+              <a:buNone/>
+            </a:pPr>
+            <a:r>
+              <a:rPr lang="pt-BR" sz="2000" dirty="0">
+                <a:solidFill>
+                  <a:schemeClr val="tx1"/>
+                </a:solidFill>
+                <a:latin typeface="Times New Roman" panose="02020603050405020304" pitchFamily="18" charset="0"/>
+                <a:cs typeface="Times New Roman" panose="02020603050405020304" pitchFamily="18" charset="0"/>
+              </a:rPr>
+              <a:t>•	Resposta do escravo</a:t>
+            </a:r>
+          </a:p>
+          <a:p>
+            <a:pPr marL="0" indent="0" algn="just">
+              <a:buNone/>
+            </a:pPr>
+            <a:r>
+              <a:rPr lang="pt-BR" sz="2000" dirty="0">
+                <a:solidFill>
+                  <a:schemeClr val="tx1"/>
+                </a:solidFill>
+                <a:latin typeface="Times New Roman" panose="02020603050405020304" pitchFamily="18" charset="0"/>
+                <a:cs typeface="Times New Roman" panose="02020603050405020304" pitchFamily="18" charset="0"/>
+              </a:rPr>
+              <a:t>•	Mudança de valor em tempo real</a:t>
+            </a:r>
+          </a:p>
+          <a:p>
+            <a:pPr marL="0" indent="0" algn="just">
+              <a:buNone/>
+            </a:pPr>
+            <a:endParaRPr lang="pt-BR" sz="2000" b="1" dirty="0">
+              <a:solidFill>
+                <a:schemeClr val="tx1"/>
+              </a:solidFill>
+              <a:latin typeface="Times New Roman" panose="02020603050405020304" pitchFamily="18" charset="0"/>
+              <a:cs typeface="Times New Roman" panose="02020603050405020304" pitchFamily="18" charset="0"/>
+            </a:endParaRPr>
+          </a:p>
+          <a:p>
+            <a:pPr marL="0" indent="0" algn="just">
+              <a:buNone/>
+            </a:pPr>
+            <a:r>
+              <a:rPr lang="pt-BR" sz="2000" b="1" dirty="0">
+                <a:solidFill>
+                  <a:schemeClr val="tx1"/>
+                </a:solidFill>
+                <a:latin typeface="Times New Roman" panose="02020603050405020304" pitchFamily="18" charset="0"/>
+                <a:cs typeface="Times New Roman" panose="02020603050405020304" pitchFamily="18" charset="0"/>
+              </a:rPr>
+              <a:t>4. Escrita de Dados</a:t>
+            </a:r>
+          </a:p>
+          <a:p>
+            <a:pPr marL="0" indent="0" algn="just">
+              <a:buNone/>
+            </a:pPr>
+            <a:r>
+              <a:rPr lang="pt-BR" sz="2000" dirty="0">
+                <a:solidFill>
+                  <a:schemeClr val="tx1"/>
+                </a:solidFill>
+                <a:latin typeface="Times New Roman" panose="02020603050405020304" pitchFamily="18" charset="0"/>
+                <a:cs typeface="Times New Roman" panose="02020603050405020304" pitchFamily="18" charset="0"/>
+              </a:rPr>
+              <a:t>•	Mestre envia comando para ligar uma bobina (</a:t>
+            </a:r>
+            <a:r>
+              <a:rPr lang="pt-BR" sz="2000" dirty="0" err="1">
+                <a:solidFill>
+                  <a:schemeClr val="tx1"/>
+                </a:solidFill>
+                <a:latin typeface="Times New Roman" panose="02020603050405020304" pitchFamily="18" charset="0"/>
+                <a:cs typeface="Times New Roman" panose="02020603050405020304" pitchFamily="18" charset="0"/>
+              </a:rPr>
+              <a:t>Coil</a:t>
+            </a:r>
+            <a:r>
+              <a:rPr lang="pt-BR" sz="2000" dirty="0">
+                <a:solidFill>
+                  <a:schemeClr val="tx1"/>
+                </a:solidFill>
+                <a:latin typeface="Times New Roman" panose="02020603050405020304" pitchFamily="18" charset="0"/>
+                <a:cs typeface="Times New Roman" panose="02020603050405020304" pitchFamily="18" charset="0"/>
+              </a:rPr>
+              <a:t> 00001)</a:t>
+            </a:r>
+          </a:p>
+          <a:p>
+            <a:pPr marL="0" indent="0" algn="just">
+              <a:buNone/>
+            </a:pPr>
+            <a:r>
+              <a:rPr lang="pt-BR" sz="2000" dirty="0">
+                <a:solidFill>
+                  <a:schemeClr val="tx1"/>
+                </a:solidFill>
+                <a:latin typeface="Times New Roman" panose="02020603050405020304" pitchFamily="18" charset="0"/>
+                <a:cs typeface="Times New Roman" panose="02020603050405020304" pitchFamily="18" charset="0"/>
+              </a:rPr>
+              <a:t>•	Simular acionamento de um motor/LED no escravo</a:t>
+            </a:r>
+          </a:p>
+          <a:p>
+            <a:pPr marL="0" indent="0" algn="just">
+              <a:buNone/>
+            </a:pPr>
+            <a:endParaRPr lang="pt-BR" sz="2000" dirty="0">
+              <a:solidFill>
+                <a:schemeClr val="tx1"/>
+              </a:solidFill>
+              <a:latin typeface="Times New Roman" panose="02020603050405020304" pitchFamily="18" charset="0"/>
+              <a:cs typeface="Times New Roman" panose="02020603050405020304" pitchFamily="18" charset="0"/>
+            </a:endParaRPr>
+          </a:p>
+        </p:txBody>
+      </p:sp>
+    </p:spTree>
+    <p:extLst>
+      <p:ext uri="{BB962C8B-B14F-4D97-AF65-F5344CB8AC3E}">
+        <p14:creationId xmlns:p14="http://schemas.microsoft.com/office/powerpoint/2010/main" val="132525629"/>
+      </p:ext>
+    </p:extLst>
+  </p:cSld>
+  <p:clrMapOvr>
+    <a:masterClrMapping/>
+  </p:clrMapOvr>
+  <p:transition spd="med"/>
+</p:sld>
+</file>
+
+<file path=ppt/slides/slide33.xml><?xml version="1.0" encoding="utf-8"?>
 <p:sld xmlns:a="http://schemas.openxmlformats.org/drawingml/2006/main" xmlns:r="http://schemas.openxmlformats.org/officeDocument/2006/relationships" xmlns:p="http://schemas.openxmlformats.org/presentationml/2006/main">
   <p:cSld>
     <p:spTree>
@@ -15534,7 +16727,7 @@
 </p:sld>
 </file>
 
-<file path=ppt/slides/slide32.xml><?xml version="1.0" encoding="utf-8"?>
+<file path=ppt/slides/slide34.xml><?xml version="1.0" encoding="utf-8"?>
 <p:sld xmlns:a="http://schemas.openxmlformats.org/drawingml/2006/main" xmlns:r="http://schemas.openxmlformats.org/officeDocument/2006/relationships" xmlns:p="http://schemas.openxmlformats.org/presentationml/2006/main">
   <p:cSld>
     <p:spTree>

</xml_diff>

<commit_message>
Disciplina CLP MODBUS - 25Abr2025
</commit_message>
<xml_diff>
--- a/01 Classes/Aula6 - CLP - Redes Industriais MODBUS.pptx
+++ b/01 Classes/Aula6 - CLP - Redes Industriais MODBUS.pptx
@@ -9437,10 +9437,20 @@
             </a:pPr>
             <a:r>
               <a:rPr lang="pt-BR" sz="2400" b="1" dirty="0">
-                <a:latin typeface="Times New Roman" panose="02020603050405020304" pitchFamily="18" charset="0"/>
-                <a:cs typeface="Times New Roman" panose="02020603050405020304" pitchFamily="18" charset="0"/>
-              </a:rPr>
-              <a:t>Escrita em Registradores (06/16): </a:t>
+                <a:highlight>
+                  <a:srgbClr val="FFFF00"/>
+                </a:highlight>
+                <a:latin typeface="Times New Roman" panose="02020603050405020304" pitchFamily="18" charset="0"/>
+                <a:cs typeface="Times New Roman" panose="02020603050405020304" pitchFamily="18" charset="0"/>
+              </a:rPr>
+              <a:t>Escrita</a:t>
+            </a:r>
+            <a:r>
+              <a:rPr lang="pt-BR" sz="2400" b="1" dirty="0">
+                <a:latin typeface="Times New Roman" panose="02020603050405020304" pitchFamily="18" charset="0"/>
+                <a:cs typeface="Times New Roman" panose="02020603050405020304" pitchFamily="18" charset="0"/>
+              </a:rPr>
+              <a:t> em Registradores (06/16): </a:t>
             </a:r>
             <a:r>
               <a:rPr lang="pt-BR" sz="2400" dirty="0">
@@ -9451,6 +9461,9 @@
             </a:r>
             <a:r>
               <a:rPr lang="pt-BR" sz="2400" b="1" dirty="0" err="1">
+                <a:solidFill>
+                  <a:srgbClr val="FF0000"/>
+                </a:solidFill>
                 <a:latin typeface="Times New Roman" panose="02020603050405020304" pitchFamily="18" charset="0"/>
                 <a:cs typeface="Times New Roman" panose="02020603050405020304" pitchFamily="18" charset="0"/>
               </a:rPr>
@@ -9662,7 +9675,7 @@
           <p:nvPr>
             <p:extLst>
               <p:ext uri="{D42A27DB-BD31-4B8C-83A1-F6EECF244321}">
-                <p14:modId xmlns:p14="http://schemas.microsoft.com/office/powerpoint/2010/main" val="2873586506"/>
+                <p14:modId xmlns:p14="http://schemas.microsoft.com/office/powerpoint/2010/main" val="315419862"/>
               </p:ext>
             </p:extLst>
           </p:nvPr>
@@ -9796,10 +9809,30 @@
                         </a:rPr>
                         <a:t>Coil</a:t>
                       </a:r>
-                      <a:endParaRPr lang="pt-BR" sz="1800" dirty="0">
-                        <a:latin typeface="Times New Roman" panose="02020603050405020304" pitchFamily="18" charset="0"/>
-                        <a:cs typeface="Times New Roman" panose="02020603050405020304" pitchFamily="18" charset="0"/>
-                      </a:endParaRPr>
+                      <a:r>
+                        <a:rPr lang="pt-BR" sz="1800" dirty="0">
+                          <a:latin typeface="Times New Roman" panose="02020603050405020304" pitchFamily="18" charset="0"/>
+                          <a:cs typeface="Times New Roman" panose="02020603050405020304" pitchFamily="18" charset="0"/>
+                        </a:rPr>
+                        <a:t> (</a:t>
+                      </a:r>
+                      <a:r>
+                        <a:rPr lang="pt-BR" sz="1800" b="1" dirty="0">
+                          <a:solidFill>
+                            <a:srgbClr val="FF0000"/>
+                          </a:solidFill>
+                          <a:latin typeface="Times New Roman" panose="02020603050405020304" pitchFamily="18" charset="0"/>
+                          <a:cs typeface="Times New Roman" panose="02020603050405020304" pitchFamily="18" charset="0"/>
+                        </a:rPr>
+                        <a:t>Bobina</a:t>
+                      </a:r>
+                      <a:r>
+                        <a:rPr lang="pt-BR" sz="1800" dirty="0">
+                          <a:latin typeface="Times New Roman" panose="02020603050405020304" pitchFamily="18" charset="0"/>
+                          <a:cs typeface="Times New Roman" panose="02020603050405020304" pitchFamily="18" charset="0"/>
+                        </a:rPr>
+                        <a:t>)</a:t>
+                      </a:r>
                     </a:p>
                   </a:txBody>
                   <a:tcPr/>
@@ -11649,18 +11682,6 @@
             </a:r>
           </a:p>
           <a:p>
-            <a:pPr marL="0" indent="0" algn="just">
-              <a:buNone/>
-            </a:pPr>
-            <a:endParaRPr lang="pt-BR" sz="2200" dirty="0">
-              <a:solidFill>
-                <a:schemeClr val="tx1"/>
-              </a:solidFill>
-              <a:latin typeface="Times New Roman" panose="02020603050405020304" pitchFamily="18" charset="0"/>
-              <a:cs typeface="Times New Roman" panose="02020603050405020304" pitchFamily="18" charset="0"/>
-            </a:endParaRPr>
-          </a:p>
-          <a:p>
             <a:pPr>
               <a:lnSpc>
                 <a:spcPct val="107000"/>
@@ -12251,7 +12272,27 @@
                 <a:latin typeface="Times New Roman" panose="02020603050405020304" pitchFamily="18" charset="0"/>
                 <a:cs typeface="Times New Roman" panose="02020603050405020304" pitchFamily="18" charset="0"/>
               </a:rPr>
-              <a:t> PIL </a:t>
+              <a:t> </a:t>
+            </a:r>
+            <a:r>
+              <a:rPr lang="pt-BR" sz="1000" b="1" dirty="0">
+                <a:solidFill>
+                  <a:srgbClr val="FF0000"/>
+                </a:solidFill>
+                <a:latin typeface="Times New Roman" panose="02020603050405020304" pitchFamily="18" charset="0"/>
+                <a:cs typeface="Times New Roman" panose="02020603050405020304" pitchFamily="18" charset="0"/>
+              </a:rPr>
+              <a:t>PIL</a:t>
+            </a:r>
+            <a:r>
+              <a:rPr lang="pt-BR" sz="1000" dirty="0">
+                <a:solidFill>
+                  <a:schemeClr val="tx1"/>
+                </a:solidFill>
+                <a:latin typeface="Times New Roman" panose="02020603050405020304" pitchFamily="18" charset="0"/>
+                <a:cs typeface="Times New Roman" panose="02020603050405020304" pitchFamily="18" charset="0"/>
+              </a:rPr>
+              <a:t> </a:t>
             </a:r>
             <a:r>
               <a:rPr lang="pt-BR" sz="1000" dirty="0" err="1">
@@ -12274,9 +12315,9 @@
               <a:t> </a:t>
             </a:r>
             <a:r>
-              <a:rPr lang="pt-BR" sz="1000" dirty="0" err="1">
-                <a:solidFill>
-                  <a:schemeClr val="tx1"/>
+              <a:rPr lang="pt-BR" sz="1000" b="1" dirty="0" err="1">
+                <a:solidFill>
+                  <a:srgbClr val="FF0000"/>
                 </a:solidFill>
                 <a:latin typeface="Times New Roman" panose="02020603050405020304" pitchFamily="18" charset="0"/>
                 <a:cs typeface="Times New Roman" panose="02020603050405020304" pitchFamily="18" charset="0"/>
@@ -12284,9 +12325,9 @@
               <a:t>Image</a:t>
             </a:r>
             <a:r>
-              <a:rPr lang="pt-BR" sz="1000" dirty="0">
-                <a:solidFill>
-                  <a:schemeClr val="tx1"/>
+              <a:rPr lang="pt-BR" sz="1000" b="1" dirty="0">
+                <a:solidFill>
+                  <a:srgbClr val="FF0000"/>
                 </a:solidFill>
                 <a:latin typeface="Times New Roman" panose="02020603050405020304" pitchFamily="18" charset="0"/>
                 <a:cs typeface="Times New Roman" panose="02020603050405020304" pitchFamily="18" charset="0"/>
@@ -12294,9 +12335,9 @@
               <a:t>, </a:t>
             </a:r>
             <a:r>
-              <a:rPr lang="pt-BR" sz="1000" dirty="0" err="1">
-                <a:solidFill>
-                  <a:schemeClr val="tx1"/>
+              <a:rPr lang="pt-BR" sz="1000" b="1" dirty="0" err="1">
+                <a:solidFill>
+                  <a:srgbClr val="FF0000"/>
                 </a:solidFill>
                 <a:latin typeface="Times New Roman" panose="02020603050405020304" pitchFamily="18" charset="0"/>
                 <a:cs typeface="Times New Roman" panose="02020603050405020304" pitchFamily="18" charset="0"/>
@@ -12304,9 +12345,9 @@
               <a:t>ImageDraw</a:t>
             </a:r>
             <a:r>
-              <a:rPr lang="pt-BR" sz="1000" dirty="0">
-                <a:solidFill>
-                  <a:schemeClr val="tx1"/>
+              <a:rPr lang="pt-BR" sz="1000" b="1" dirty="0">
+                <a:solidFill>
+                  <a:srgbClr val="FF0000"/>
                 </a:solidFill>
                 <a:latin typeface="Times New Roman" panose="02020603050405020304" pitchFamily="18" charset="0"/>
                 <a:cs typeface="Times New Roman" panose="02020603050405020304" pitchFamily="18" charset="0"/>
@@ -12314,22 +12355,35 @@
               <a:t>, </a:t>
             </a:r>
             <a:r>
-              <a:rPr lang="pt-BR" sz="1000" dirty="0" err="1">
-                <a:solidFill>
-                  <a:schemeClr val="tx1"/>
+              <a:rPr lang="pt-BR" sz="1000" b="1" dirty="0" err="1">
+                <a:solidFill>
+                  <a:srgbClr val="FF0000"/>
                 </a:solidFill>
                 <a:latin typeface="Times New Roman" panose="02020603050405020304" pitchFamily="18" charset="0"/>
                 <a:cs typeface="Times New Roman" panose="02020603050405020304" pitchFamily="18" charset="0"/>
               </a:rPr>
               <a:t>ImageFont</a:t>
             </a:r>
-            <a:endParaRPr lang="pt-BR" sz="1000" dirty="0">
-              <a:solidFill>
-                <a:schemeClr val="tx1"/>
-              </a:solidFill>
-              <a:latin typeface="Times New Roman" panose="02020603050405020304" pitchFamily="18" charset="0"/>
-              <a:cs typeface="Times New Roman" panose="02020603050405020304" pitchFamily="18" charset="0"/>
-            </a:endParaRPr>
+            <a:r>
+              <a:rPr lang="pt-BR" sz="1000" b="1" dirty="0">
+                <a:solidFill>
+                  <a:srgbClr val="FF0000"/>
+                </a:solidFill>
+                <a:latin typeface="Times New Roman" panose="02020603050405020304" pitchFamily="18" charset="0"/>
+                <a:cs typeface="Times New Roman" panose="02020603050405020304" pitchFamily="18" charset="0"/>
+              </a:rPr>
+              <a:t> // </a:t>
+            </a:r>
+            <a:r>
+              <a:rPr lang="pt-BR" sz="1000" b="1" dirty="0">
+                <a:solidFill>
+                  <a:schemeClr val="tx1"/>
+                </a:solidFill>
+                <a:latin typeface="Times New Roman" panose="02020603050405020304" pitchFamily="18" charset="0"/>
+                <a:cs typeface="Times New Roman" panose="02020603050405020304" pitchFamily="18" charset="0"/>
+              </a:rPr>
+              <a:t>PILLOW</a:t>
+            </a:r>
           </a:p>
           <a:p>
             <a:pPr marL="0" indent="0" algn="just">
@@ -12356,6 +12410,16 @@
               <a:t> </a:t>
             </a:r>
             <a:r>
+              <a:rPr lang="pt-BR" sz="1000" b="1" dirty="0" err="1">
+                <a:solidFill>
+                  <a:srgbClr val="FF0000"/>
+                </a:solidFill>
+                <a:latin typeface="Times New Roman" panose="02020603050405020304" pitchFamily="18" charset="0"/>
+                <a:cs typeface="Times New Roman" panose="02020603050405020304" pitchFamily="18" charset="0"/>
+              </a:rPr>
+              <a:t>matplotlib</a:t>
+            </a:r>
+            <a:r>
               <a:rPr lang="pt-BR" sz="1000" dirty="0" err="1">
                 <a:solidFill>
                   <a:schemeClr val="tx1"/>
@@ -12363,7 +12427,17 @@
                 <a:latin typeface="Times New Roman" panose="02020603050405020304" pitchFamily="18" charset="0"/>
                 <a:cs typeface="Times New Roman" panose="02020603050405020304" pitchFamily="18" charset="0"/>
               </a:rPr>
-              <a:t>matplotlib.pyplot</a:t>
+              <a:t>.</a:t>
+            </a:r>
+            <a:r>
+              <a:rPr lang="pt-BR" sz="1000" b="1" dirty="0" err="1">
+                <a:solidFill>
+                  <a:srgbClr val="FF0000"/>
+                </a:solidFill>
+                <a:latin typeface="Times New Roman" panose="02020603050405020304" pitchFamily="18" charset="0"/>
+                <a:cs typeface="Times New Roman" panose="02020603050405020304" pitchFamily="18" charset="0"/>
+              </a:rPr>
+              <a:t>pyplot</a:t>
             </a:r>
             <a:r>
               <a:rPr lang="pt-BR" sz="1000" dirty="0">
@@ -15380,13 +15454,10 @@
             <a:pPr marL="0" indent="0" algn="just">
               <a:buNone/>
             </a:pPr>
-            <a:r>
-              <a:rPr lang="pt-BR" sz="2200" dirty="0">
-                <a:latin typeface="Times New Roman" panose="02020603050405020304" pitchFamily="18" charset="0"/>
-                <a:cs typeface="Times New Roman" panose="02020603050405020304" pitchFamily="18" charset="0"/>
-              </a:rPr>
-              <a:t>....</a:t>
-            </a:r>
+            <a:endParaRPr lang="pt-BR" sz="2200" dirty="0">
+              <a:latin typeface="Times New Roman" panose="02020603050405020304" pitchFamily="18" charset="0"/>
+              <a:cs typeface="Times New Roman" panose="02020603050405020304" pitchFamily="18" charset="0"/>
+            </a:endParaRPr>
           </a:p>
         </p:txBody>
       </p:sp>
@@ -15418,7 +15489,7 @@
         </p:blipFill>
         <p:spPr>
           <a:xfrm>
-            <a:off x="136079" y="1068665"/>
+            <a:off x="862217" y="1068665"/>
             <a:ext cx="6873610" cy="3866405"/>
           </a:xfrm>
           <a:prstGeom prst="rect">
@@ -15487,7 +15558,7 @@
         </p:spPr>
         <p:txBody>
           <a:bodyPr>
-            <a:normAutofit fontScale="90000"/>
+            <a:normAutofit/>
           </a:bodyPr>
           <a:lstStyle/>
           <a:p>
@@ -15505,23 +15576,7 @@
                   <a:srgbClr val="0070C0"/>
                 </a:solidFill>
               </a:rPr>
-              <a:t> </a:t>
-            </a:r>
-            <a:r>
-              <a:rPr lang="en-US" b="1" dirty="0" err="1">
-                <a:solidFill>
-                  <a:srgbClr val="0070C0"/>
-                </a:solidFill>
-              </a:rPr>
-              <a:t>Comunicação</a:t>
-            </a:r>
-            <a:r>
-              <a:rPr lang="en-US" b="1" dirty="0">
-                <a:solidFill>
-                  <a:srgbClr val="0070C0"/>
-                </a:solidFill>
-              </a:rPr>
-              <a:t> CLP com MODBUS</a:t>
+              <a:t>: CLP com MODBUS</a:t>
             </a:r>
           </a:p>
         </p:txBody>
@@ -15557,18 +15612,6 @@
             <a:pPr marL="0" indent="0" algn="just">
               <a:buNone/>
             </a:pPr>
-            <a:endParaRPr lang="pt-BR" sz="2000" dirty="0">
-              <a:solidFill>
-                <a:schemeClr val="tx1"/>
-              </a:solidFill>
-              <a:latin typeface="Times New Roman" panose="02020603050405020304" pitchFamily="18" charset="0"/>
-              <a:cs typeface="Times New Roman" panose="02020603050405020304" pitchFamily="18" charset="0"/>
-            </a:endParaRPr>
-          </a:p>
-          <a:p>
-            <a:pPr marL="0" indent="0" algn="just">
-              <a:buNone/>
-            </a:pPr>
             <a:r>
               <a:rPr lang="pt-BR" sz="2000" dirty="0">
                 <a:solidFill>
@@ -15740,113 +15783,13 @@
             <a:r>
               <a:rPr lang="pt-BR" sz="2000" b="1" dirty="0">
                 <a:solidFill>
-                  <a:schemeClr val="tx1"/>
+                  <a:srgbClr val="FF0000"/>
                 </a:solidFill>
                 <a:latin typeface="Times New Roman" panose="02020603050405020304" pitchFamily="18" charset="0"/>
                 <a:cs typeface="Times New Roman" panose="02020603050405020304" pitchFamily="18" charset="0"/>
               </a:rPr>
               <a:t>Materiais</a:t>
             </a:r>
-            <a:r>
-              <a:rPr lang="pt-BR" sz="2000" dirty="0">
-                <a:solidFill>
-                  <a:schemeClr val="tx1"/>
-                </a:solidFill>
-                <a:latin typeface="Times New Roman" panose="02020603050405020304" pitchFamily="18" charset="0"/>
-                <a:cs typeface="Times New Roman" panose="02020603050405020304" pitchFamily="18" charset="0"/>
-              </a:rPr>
-              <a:t>:</a:t>
-            </a:r>
-          </a:p>
-          <a:p>
-            <a:pPr marL="0" indent="0" algn="just">
-              <a:buNone/>
-            </a:pPr>
-            <a:r>
-              <a:rPr lang="pt-BR" sz="2000" dirty="0">
-                <a:solidFill>
-                  <a:schemeClr val="tx1"/>
-                </a:solidFill>
-                <a:latin typeface="Times New Roman" panose="02020603050405020304" pitchFamily="18" charset="0"/>
-                <a:cs typeface="Times New Roman" panose="02020603050405020304" pitchFamily="18" charset="0"/>
-              </a:rPr>
-              <a:t>•	Software: </a:t>
-            </a:r>
-            <a:r>
-              <a:rPr lang="pt-BR" sz="2000" dirty="0" err="1">
-                <a:solidFill>
-                  <a:schemeClr val="tx1"/>
-                </a:solidFill>
-                <a:latin typeface="Times New Roman" panose="02020603050405020304" pitchFamily="18" charset="0"/>
-                <a:cs typeface="Times New Roman" panose="02020603050405020304" pitchFamily="18" charset="0"/>
-              </a:rPr>
-              <a:t>Codesys</a:t>
-            </a:r>
-            <a:r>
-              <a:rPr lang="pt-BR" sz="2000" dirty="0">
-                <a:solidFill>
-                  <a:schemeClr val="tx1"/>
-                </a:solidFill>
-                <a:latin typeface="Times New Roman" panose="02020603050405020304" pitchFamily="18" charset="0"/>
-                <a:cs typeface="Times New Roman" panose="02020603050405020304" pitchFamily="18" charset="0"/>
-              </a:rPr>
-              <a:t>, </a:t>
-            </a:r>
-            <a:r>
-              <a:rPr lang="pt-BR" sz="2000" dirty="0" err="1">
-                <a:solidFill>
-                  <a:schemeClr val="tx1"/>
-                </a:solidFill>
-                <a:latin typeface="Times New Roman" panose="02020603050405020304" pitchFamily="18" charset="0"/>
-                <a:cs typeface="Times New Roman" panose="02020603050405020304" pitchFamily="18" charset="0"/>
-              </a:rPr>
-              <a:t>Modbus</a:t>
-            </a:r>
-            <a:r>
-              <a:rPr lang="pt-BR" sz="2000" dirty="0">
-                <a:solidFill>
-                  <a:schemeClr val="tx1"/>
-                </a:solidFill>
-                <a:latin typeface="Times New Roman" panose="02020603050405020304" pitchFamily="18" charset="0"/>
-                <a:cs typeface="Times New Roman" panose="02020603050405020304" pitchFamily="18" charset="0"/>
-              </a:rPr>
-              <a:t> Poll ou TIA Portal + PLCSIM</a:t>
-            </a:r>
-          </a:p>
-          <a:p>
-            <a:pPr marL="0" indent="0" algn="just">
-              <a:buNone/>
-            </a:pPr>
-            <a:r>
-              <a:rPr lang="pt-BR" sz="2000" dirty="0">
-                <a:solidFill>
-                  <a:schemeClr val="tx1"/>
-                </a:solidFill>
-                <a:latin typeface="Times New Roman" panose="02020603050405020304" pitchFamily="18" charset="0"/>
-                <a:cs typeface="Times New Roman" panose="02020603050405020304" pitchFamily="18" charset="0"/>
-              </a:rPr>
-              <a:t>•	CLP real ou simulado</a:t>
-            </a:r>
-          </a:p>
-          <a:p>
-            <a:pPr marL="0" indent="0" algn="just">
-              <a:buNone/>
-            </a:pPr>
-            <a:r>
-              <a:rPr lang="pt-BR" sz="2000" dirty="0">
-                <a:solidFill>
-                  <a:schemeClr val="tx1"/>
-                </a:solidFill>
-                <a:latin typeface="Times New Roman" panose="02020603050405020304" pitchFamily="18" charset="0"/>
-                <a:cs typeface="Times New Roman" panose="02020603050405020304" pitchFamily="18" charset="0"/>
-              </a:rPr>
-              <a:t>•	Cabo RS-485 ou rede Ethernet (se for TCP)</a:t>
-            </a:r>
-          </a:p>
-          <a:p>
-            <a:pPr marL="0" indent="0" algn="just">
-              <a:buNone/>
-            </a:pPr>
             <a:endParaRPr lang="pt-BR" sz="2000" dirty="0">
               <a:solidFill>
                 <a:schemeClr val="tx1"/>
@@ -15854,6 +15797,91 @@
               <a:latin typeface="Times New Roman" panose="02020603050405020304" pitchFamily="18" charset="0"/>
               <a:cs typeface="Times New Roman" panose="02020603050405020304" pitchFamily="18" charset="0"/>
             </a:endParaRPr>
+          </a:p>
+          <a:p>
+            <a:pPr marL="0" indent="0" algn="just">
+              <a:buNone/>
+            </a:pPr>
+            <a:r>
+              <a:rPr lang="pt-BR" sz="2000" dirty="0">
+                <a:solidFill>
+                  <a:schemeClr val="tx1"/>
+                </a:solidFill>
+                <a:latin typeface="Times New Roman" panose="02020603050405020304" pitchFamily="18" charset="0"/>
+                <a:cs typeface="Times New Roman" panose="02020603050405020304" pitchFamily="18" charset="0"/>
+              </a:rPr>
+              <a:t>•	Software: </a:t>
+            </a:r>
+            <a:r>
+              <a:rPr lang="pt-BR" sz="2000" dirty="0" err="1">
+                <a:solidFill>
+                  <a:schemeClr val="tx1"/>
+                </a:solidFill>
+                <a:latin typeface="Times New Roman" panose="02020603050405020304" pitchFamily="18" charset="0"/>
+                <a:cs typeface="Times New Roman" panose="02020603050405020304" pitchFamily="18" charset="0"/>
+              </a:rPr>
+              <a:t>Codesys</a:t>
+            </a:r>
+            <a:r>
+              <a:rPr lang="pt-BR" sz="2000" dirty="0">
+                <a:solidFill>
+                  <a:schemeClr val="tx1"/>
+                </a:solidFill>
+                <a:latin typeface="Times New Roman" panose="02020603050405020304" pitchFamily="18" charset="0"/>
+                <a:cs typeface="Times New Roman" panose="02020603050405020304" pitchFamily="18" charset="0"/>
+              </a:rPr>
+              <a:t>, </a:t>
+            </a:r>
+            <a:r>
+              <a:rPr lang="pt-BR" sz="2000" dirty="0" err="1">
+                <a:solidFill>
+                  <a:schemeClr val="tx1"/>
+                </a:solidFill>
+                <a:latin typeface="Times New Roman" panose="02020603050405020304" pitchFamily="18" charset="0"/>
+                <a:cs typeface="Times New Roman" panose="02020603050405020304" pitchFamily="18" charset="0"/>
+              </a:rPr>
+              <a:t>Modbus</a:t>
+            </a:r>
+            <a:r>
+              <a:rPr lang="pt-BR" sz="2000" dirty="0">
+                <a:solidFill>
+                  <a:schemeClr val="tx1"/>
+                </a:solidFill>
+                <a:latin typeface="Times New Roman" panose="02020603050405020304" pitchFamily="18" charset="0"/>
+                <a:cs typeface="Times New Roman" panose="02020603050405020304" pitchFamily="18" charset="0"/>
+              </a:rPr>
+              <a:t> Poll ou TIA Portal + PLCSIM</a:t>
+            </a:r>
+          </a:p>
+          <a:p>
+            <a:pPr marL="0" indent="0" algn="just">
+              <a:buNone/>
+            </a:pPr>
+            <a:r>
+              <a:rPr lang="pt-BR" sz="2000" dirty="0">
+                <a:solidFill>
+                  <a:schemeClr val="tx1"/>
+                </a:solidFill>
+                <a:latin typeface="Times New Roman" panose="02020603050405020304" pitchFamily="18" charset="0"/>
+                <a:cs typeface="Times New Roman" panose="02020603050405020304" pitchFamily="18" charset="0"/>
+              </a:rPr>
+              <a:t>•	CLP real ou simulado</a:t>
+            </a:r>
+          </a:p>
+          <a:p>
+            <a:pPr marL="0" indent="0" algn="just">
+              <a:buNone/>
+            </a:pPr>
+            <a:r>
+              <a:rPr lang="pt-BR" sz="2000" dirty="0">
+                <a:solidFill>
+                  <a:schemeClr val="tx1"/>
+                </a:solidFill>
+                <a:latin typeface="Times New Roman" panose="02020603050405020304" pitchFamily="18" charset="0"/>
+                <a:cs typeface="Times New Roman" panose="02020603050405020304" pitchFamily="18" charset="0"/>
+              </a:rPr>
+              <a:t>•	Cabo RS-485 ou rede Ethernet (se for TCP)</a:t>
+            </a:r>
           </a:p>
         </p:txBody>
       </p:sp>
@@ -15936,21 +15964,8 @@
                   <a:srgbClr val="0070C0"/>
                 </a:solidFill>
               </a:rPr>
-              <a:t>/</a:t>
-            </a:r>
-            <a:r>
-              <a:rPr lang="en-US" b="1" dirty="0" err="1">
-                <a:solidFill>
-                  <a:srgbClr val="0070C0"/>
-                </a:solidFill>
-              </a:rPr>
-              <a:t>Atividades</a:t>
-            </a:r>
-            <a:endParaRPr lang="en-US" b="1" dirty="0">
-              <a:solidFill>
-                <a:srgbClr val="0070C0"/>
-              </a:solidFill>
-            </a:endParaRPr>
+              <a:t>  CLP com MODBUS</a:t>
+            </a:r>
           </a:p>
         </p:txBody>
       </p:sp>
@@ -16286,21 +16301,8 @@
                   <a:srgbClr val="0070C0"/>
                 </a:solidFill>
               </a:rPr>
-              <a:t>/</a:t>
-            </a:r>
-            <a:r>
-              <a:rPr lang="en-US" b="1" dirty="0" err="1">
-                <a:solidFill>
-                  <a:srgbClr val="0070C0"/>
-                </a:solidFill>
-              </a:rPr>
-              <a:t>Atividades</a:t>
-            </a:r>
-            <a:endParaRPr lang="en-US" b="1" dirty="0">
-              <a:solidFill>
-                <a:srgbClr val="0070C0"/>
-              </a:solidFill>
-            </a:endParaRPr>
+              <a:t>: CLP com MODBUS</a:t>
+            </a:r>
           </a:p>
         </p:txBody>
       </p:sp>
@@ -16654,7 +16656,114 @@
               </a:rPr>
               <a:t>[1] </a:t>
             </a:r>
-            <a:endParaRPr lang="pt-BR" sz="2000" b="1" dirty="0">
+            <a:r>
+              <a:rPr lang="pt-BR" sz="2000" b="1" dirty="0">
+                <a:latin typeface="Times New Roman" panose="02020603050405020304" pitchFamily="18" charset="0"/>
+                <a:cs typeface="Times New Roman" panose="02020603050405020304" pitchFamily="18" charset="0"/>
+              </a:rPr>
+              <a:t>MODBUS ORGANIZATION. </a:t>
+            </a:r>
+            <a:r>
+              <a:rPr lang="pt-BR" sz="2000" dirty="0" err="1">
+                <a:latin typeface="Times New Roman" panose="02020603050405020304" pitchFamily="18" charset="0"/>
+                <a:cs typeface="Times New Roman" panose="02020603050405020304" pitchFamily="18" charset="0"/>
+              </a:rPr>
+              <a:t>Modbus</a:t>
+            </a:r>
+            <a:r>
+              <a:rPr lang="pt-BR" sz="2000" dirty="0">
+                <a:latin typeface="Times New Roman" panose="02020603050405020304" pitchFamily="18" charset="0"/>
+                <a:cs typeface="Times New Roman" panose="02020603050405020304" pitchFamily="18" charset="0"/>
+              </a:rPr>
+              <a:t> </a:t>
+            </a:r>
+            <a:r>
+              <a:rPr lang="pt-BR" sz="2000" dirty="0" err="1">
+                <a:latin typeface="Times New Roman" panose="02020603050405020304" pitchFamily="18" charset="0"/>
+                <a:cs typeface="Times New Roman" panose="02020603050405020304" pitchFamily="18" charset="0"/>
+              </a:rPr>
+              <a:t>Application</a:t>
+            </a:r>
+            <a:r>
+              <a:rPr lang="pt-BR" sz="2000" dirty="0">
+                <a:latin typeface="Times New Roman" panose="02020603050405020304" pitchFamily="18" charset="0"/>
+                <a:cs typeface="Times New Roman" panose="02020603050405020304" pitchFamily="18" charset="0"/>
+              </a:rPr>
+              <a:t> </a:t>
+            </a:r>
+            <a:r>
+              <a:rPr lang="pt-BR" sz="2000" dirty="0" err="1">
+                <a:latin typeface="Times New Roman" panose="02020603050405020304" pitchFamily="18" charset="0"/>
+                <a:cs typeface="Times New Roman" panose="02020603050405020304" pitchFamily="18" charset="0"/>
+              </a:rPr>
+              <a:t>Protocol</a:t>
+            </a:r>
+            <a:r>
+              <a:rPr lang="pt-BR" sz="2000" dirty="0">
+                <a:latin typeface="Times New Roman" panose="02020603050405020304" pitchFamily="18" charset="0"/>
+                <a:cs typeface="Times New Roman" panose="02020603050405020304" pitchFamily="18" charset="0"/>
+              </a:rPr>
+              <a:t> V1.1b3. 2021. </a:t>
+            </a:r>
+            <a:r>
+              <a:rPr lang="pt-BR" sz="2000" b="1" dirty="0">
+                <a:solidFill>
+                  <a:srgbClr val="FF0000"/>
+                </a:solidFill>
+                <a:latin typeface="Times New Roman" panose="02020603050405020304" pitchFamily="18" charset="0"/>
+                <a:cs typeface="Times New Roman" panose="02020603050405020304" pitchFamily="18" charset="0"/>
+              </a:rPr>
+              <a:t>Disponível em:</a:t>
+            </a:r>
+          </a:p>
+          <a:p>
+            <a:pPr marL="0" indent="0" algn="just">
+              <a:buNone/>
+            </a:pPr>
+            <a:r>
+              <a:rPr lang="pt-BR" sz="2000" dirty="0">
+                <a:latin typeface="Times New Roman" panose="02020603050405020304" pitchFamily="18" charset="0"/>
+                <a:cs typeface="Times New Roman" panose="02020603050405020304" pitchFamily="18" charset="0"/>
+              </a:rPr>
+              <a:t> </a:t>
+            </a:r>
+            <a:r>
+              <a:rPr lang="pt-BR" sz="2000" dirty="0">
+                <a:latin typeface="Times New Roman" panose="02020603050405020304" pitchFamily="18" charset="0"/>
+                <a:cs typeface="Times New Roman" panose="02020603050405020304" pitchFamily="18" charset="0"/>
+                <a:hlinkClick r:id="rId3"/>
+              </a:rPr>
+              <a:t>https://www.modbus.org/</a:t>
+            </a:r>
+            <a:r>
+              <a:rPr lang="pt-BR" sz="2000" dirty="0" err="1">
+                <a:latin typeface="Times New Roman" panose="02020603050405020304" pitchFamily="18" charset="0"/>
+                <a:cs typeface="Times New Roman" panose="02020603050405020304" pitchFamily="18" charset="0"/>
+                <a:hlinkClick r:id="rId3"/>
+              </a:rPr>
+              <a:t>docs</a:t>
+            </a:r>
+            <a:r>
+              <a:rPr lang="pt-BR" sz="2000" dirty="0">
+                <a:latin typeface="Times New Roman" panose="02020603050405020304" pitchFamily="18" charset="0"/>
+                <a:cs typeface="Times New Roman" panose="02020603050405020304" pitchFamily="18" charset="0"/>
+                <a:hlinkClick r:id="rId3"/>
+              </a:rPr>
+              <a:t>/Modbus_Application_Protocol_V1_1b3.pdf</a:t>
+            </a:r>
+            <a:r>
+              <a:rPr lang="pt-BR" sz="2000" dirty="0">
+                <a:latin typeface="Times New Roman" panose="02020603050405020304" pitchFamily="18" charset="0"/>
+                <a:cs typeface="Times New Roman" panose="02020603050405020304" pitchFamily="18" charset="0"/>
+              </a:rPr>
+              <a:t>. Acesso em: 24 abr. 2025. </a:t>
+            </a:r>
+          </a:p>
+          <a:p>
+            <a:pPr marL="0" indent="0" algn="just">
+              <a:buNone/>
+            </a:pPr>
+            <a:endParaRPr lang="pt-BR" sz="2000" dirty="0">
               <a:latin typeface="Times New Roman" panose="02020603050405020304" pitchFamily="18" charset="0"/>
               <a:cs typeface="Times New Roman" panose="02020603050405020304" pitchFamily="18" charset="0"/>
             </a:endParaRPr>
@@ -16663,7 +16772,7 @@
             <a:pPr marL="0" indent="0" algn="just">
               <a:buNone/>
             </a:pPr>
-            <a:endParaRPr lang="en-US" sz="2000" dirty="0">
+            <a:endParaRPr lang="pt-BR" sz="2000" dirty="0">
               <a:latin typeface="Times New Roman" panose="02020603050405020304" pitchFamily="18" charset="0"/>
               <a:cs typeface="Times New Roman" panose="02020603050405020304" pitchFamily="18" charset="0"/>
             </a:endParaRPr>
@@ -16672,39 +16781,40 @@
             <a:pPr marL="0" indent="0" algn="just">
               <a:buNone/>
             </a:pPr>
-            <a:endParaRPr lang="en-US" sz="2000" dirty="0">
-              <a:latin typeface="Times New Roman" panose="02020603050405020304" pitchFamily="18" charset="0"/>
-              <a:cs typeface="Times New Roman" panose="02020603050405020304" pitchFamily="18" charset="0"/>
-            </a:endParaRPr>
-          </a:p>
-          <a:p>
-            <a:pPr marL="0" indent="0" algn="just">
-              <a:buNone/>
-            </a:pPr>
-            <a:endParaRPr lang="en-US" sz="2000" dirty="0">
-              <a:latin typeface="Times New Roman" panose="02020603050405020304" pitchFamily="18" charset="0"/>
-              <a:cs typeface="Times New Roman" panose="02020603050405020304" pitchFamily="18" charset="0"/>
-            </a:endParaRPr>
-          </a:p>
-          <a:p>
-            <a:pPr marL="0" indent="0" algn="just">
-              <a:buNone/>
-            </a:pPr>
-            <a:endParaRPr lang="en-US" sz="2000" dirty="0">
-              <a:latin typeface="Times New Roman" panose="02020603050405020304" pitchFamily="18" charset="0"/>
-              <a:cs typeface="Times New Roman" panose="02020603050405020304" pitchFamily="18" charset="0"/>
-            </a:endParaRPr>
-          </a:p>
-          <a:p>
-            <a:pPr marL="0" indent="0" algn="just">
-              <a:buNone/>
-            </a:pPr>
             <a:r>
               <a:rPr lang="pt-BR" sz="2000" dirty="0">
                 <a:latin typeface="Times New Roman" panose="02020603050405020304" pitchFamily="18" charset="0"/>
                 <a:cs typeface="Times New Roman" panose="02020603050405020304" pitchFamily="18" charset="0"/>
               </a:rPr>
               <a:t>[2] </a:t>
+            </a:r>
+            <a:r>
+              <a:rPr lang="pt-BR" sz="2000" b="1" dirty="0">
+                <a:latin typeface="Times New Roman" panose="02020603050405020304" pitchFamily="18" charset="0"/>
+                <a:cs typeface="Times New Roman" panose="02020603050405020304" pitchFamily="18" charset="0"/>
+              </a:rPr>
+              <a:t>SAUTER, M. </a:t>
+            </a:r>
+            <a:r>
+              <a:rPr lang="pt-BR" sz="2000" dirty="0">
+                <a:latin typeface="Times New Roman" panose="02020603050405020304" pitchFamily="18" charset="0"/>
+                <a:cs typeface="Times New Roman" panose="02020603050405020304" pitchFamily="18" charset="0"/>
+              </a:rPr>
+              <a:t>Industrial Communication Systems. </a:t>
+            </a:r>
+            <a:r>
+              <a:rPr lang="pt-BR" sz="2000" dirty="0" err="1">
+                <a:latin typeface="Times New Roman" panose="02020603050405020304" pitchFamily="18" charset="0"/>
+                <a:cs typeface="Times New Roman" panose="02020603050405020304" pitchFamily="18" charset="0"/>
+              </a:rPr>
+              <a:t>Wiley</a:t>
+            </a:r>
+            <a:r>
+              <a:rPr lang="pt-BR" sz="2000" dirty="0">
+                <a:latin typeface="Times New Roman" panose="02020603050405020304" pitchFamily="18" charset="0"/>
+                <a:cs typeface="Times New Roman" panose="02020603050405020304" pitchFamily="18" charset="0"/>
+              </a:rPr>
+              <a:t>, 2010.</a:t>
             </a:r>
             <a:endParaRPr lang="pt-BR" sz="2000" b="1" dirty="0">
               <a:latin typeface="Times New Roman" panose="02020603050405020304" pitchFamily="18" charset="0"/>

</xml_diff>